<commit_message>
modifications for DS trainings
</commit_message>
<xml_diff>
--- a/Instructor/CISW - Foundations Section 2.pptx
+++ b/Instructor/CISW - Foundations Section 2.pptx
@@ -2355,6 +2355,44 @@
         </a:p>
       </dgm:t>
     </dgm:pt>
+    <dgm:pt modelId="{459A1013-0A03-42AB-915D-FC793F5268A6}">
+      <dgm:prSet phldrT="[Text]" custT="1"/>
+      <dgm:spPr/>
+      <dgm:t>
+        <a:bodyPr/>
+        <a:lstStyle/>
+        <a:p>
+          <a:r>
+            <a:rPr lang="en-US" sz="2000" dirty="0">
+              <a:latin typeface="+mj-lt"/>
+            </a:rPr>
+            <a:t>Evaluation</a:t>
+          </a:r>
+        </a:p>
+      </dgm:t>
+    </dgm:pt>
+    <dgm:pt modelId="{8AEAA077-4259-4C23-AD7B-490841F0C203}" type="parTrans" cxnId="{5F5B1E8A-7558-4499-8BC9-E5245219D0BB}">
+      <dgm:prSet/>
+      <dgm:spPr/>
+      <dgm:t>
+        <a:bodyPr/>
+        <a:lstStyle/>
+        <a:p>
+          <a:endParaRPr lang="en-US"/>
+        </a:p>
+      </dgm:t>
+    </dgm:pt>
+    <dgm:pt modelId="{114433D9-7FE6-4491-9053-247CC035F022}" type="sibTrans" cxnId="{5F5B1E8A-7558-4499-8BC9-E5245219D0BB}">
+      <dgm:prSet/>
+      <dgm:spPr/>
+      <dgm:t>
+        <a:bodyPr/>
+        <a:lstStyle/>
+        <a:p>
+          <a:endParaRPr lang="en-US"/>
+        </a:p>
+      </dgm:t>
+    </dgm:pt>
     <dgm:pt modelId="{C5ED45AB-5708-4618-8F2A-585D84BC9EAD}" type="pres">
       <dgm:prSet presAssocID="{A6842990-62A4-4545-B120-1F8AF25A0D6E}" presName="Name0" presStyleCnt="0">
         <dgm:presLayoutVars>
@@ -2488,39 +2526,41 @@
     </dgm:pt>
   </dgm:ptLst>
   <dgm:cxnLst>
+    <dgm:cxn modelId="{DDE004FE-29B7-4A52-86FC-2EB3E9848396}" type="presOf" srcId="{31989D70-38F8-40B4-A5B4-5B64244B04DB}" destId="{C971C0CD-D6D6-4BD2-B517-483DD2B85EA0}" srcOrd="0" destOrd="0" presId="urn:microsoft.com/office/officeart/2005/8/layout/vList5"/>
+    <dgm:cxn modelId="{1FC3DAAC-2674-4AC0-A681-6AC6E1E041FE}" type="presOf" srcId="{07E81225-DE19-4D3E-99CD-FC123A33837F}" destId="{DE1FE771-1582-4775-9E8F-B758D933162D}" srcOrd="0" destOrd="0" presId="urn:microsoft.com/office/officeart/2005/8/layout/vList5"/>
+    <dgm:cxn modelId="{60DB5F81-807B-4DAD-8ED9-6DCE2A60111F}" type="presOf" srcId="{8589F281-C004-49C2-9A17-144391E503DE}" destId="{43C6ABD0-F64A-458E-8A26-0D837897DC64}" srcOrd="0" destOrd="0" presId="urn:microsoft.com/office/officeart/2005/8/layout/vList5"/>
+    <dgm:cxn modelId="{220E0694-B595-46BE-BDB9-2B1763BF7F42}" srcId="{0FF8BA2A-500B-413D-8B7A-0FD72A53075A}" destId="{7C9DA717-4609-4F35-9627-FBCE587B2E07}" srcOrd="1" destOrd="0" parTransId="{E5D39B11-6038-4BAB-A377-66C89B23A4FE}" sibTransId="{C70C4ADA-4F3B-4BCA-9873-A32F1BD4BEED}"/>
+    <dgm:cxn modelId="{8122CC33-B4F2-4AA4-9832-D53CD089768C}" type="presOf" srcId="{75DF6D0E-EF2D-4899-8D56-11F561E3DB25}" destId="{C5DBDEB5-64EF-486D-ADE8-9AD2774135B2}" srcOrd="0" destOrd="0" presId="urn:microsoft.com/office/officeart/2005/8/layout/vList5"/>
+    <dgm:cxn modelId="{5B8A5B89-8F81-44AC-99A7-28416883F921}" type="presOf" srcId="{459A1013-0A03-42AB-915D-FC793F5268A6}" destId="{EF322D6C-1CB6-431F-8B42-A64D898D2824}" srcOrd="0" destOrd="2" presId="urn:microsoft.com/office/officeart/2005/8/layout/vList5"/>
+    <dgm:cxn modelId="{657DF6AF-D666-4D2C-A115-75BA748559C6}" type="presOf" srcId="{8A560357-68DD-41D8-841B-C94F1FF7F8C1}" destId="{B35FD520-5FF0-41BD-887C-8B0911FFCB12}" srcOrd="0" destOrd="2" presId="urn:microsoft.com/office/officeart/2005/8/layout/vList5"/>
+    <dgm:cxn modelId="{2178D97F-3CAA-4CEB-BCA2-825BD11AB20F}" type="presOf" srcId="{FFA8810D-171E-4ADC-9CA8-AD57E9D504B9}" destId="{B35FD520-5FF0-41BD-887C-8B0911FFCB12}" srcOrd="0" destOrd="1" presId="urn:microsoft.com/office/officeart/2005/8/layout/vList5"/>
+    <dgm:cxn modelId="{F9E74B76-F3C8-474B-BE2E-672A4119380A}" srcId="{31989D70-38F8-40B4-A5B4-5B64244B04DB}" destId="{07E81225-DE19-4D3E-99CD-FC123A33837F}" srcOrd="0" destOrd="0" parTransId="{642D5DAC-991D-456E-978D-DDF8870668E2}" sibTransId="{71EEF2D0-2FC1-4663-8EEF-F8400FED6EFD}"/>
+    <dgm:cxn modelId="{6D9D5740-A78E-432A-A19B-79A7629DFBD0}" srcId="{F1A8E0FB-6830-44B9-AD5D-2C6541803F4D}" destId="{8A560357-68DD-41D8-841B-C94F1FF7F8C1}" srcOrd="2" destOrd="0" parTransId="{3BC3B257-E716-47FF-9C4E-A1CCC502A26F}" sibTransId="{0F75D6C4-A5C5-4C0B-A3E7-E1F9127F0B24}"/>
+    <dgm:cxn modelId="{DB01149F-013B-4AAC-83B8-EA5A02812FB1}" srcId="{F1A8E0FB-6830-44B9-AD5D-2C6541803F4D}" destId="{6DCAF490-84DF-45AB-95F8-850141BC8BDF}" srcOrd="0" destOrd="0" parTransId="{313354FE-947E-4C91-850E-55158EB5406E}" sibTransId="{263CB43B-A0A5-48BB-9C20-6635267C3C22}"/>
+    <dgm:cxn modelId="{E0CB53AF-1846-4839-A817-1BC95F8C73F9}" srcId="{F1A8E0FB-6830-44B9-AD5D-2C6541803F4D}" destId="{FFA8810D-171E-4ADC-9CA8-AD57E9D504B9}" srcOrd="1" destOrd="0" parTransId="{5D65951A-CE03-4794-9B2D-0A910A6F7FFB}" sibTransId="{39C8D19E-6ADE-404A-843B-5F7020E72704}"/>
     <dgm:cxn modelId="{0E99CA05-F61F-4393-A01F-8CCEDBA18F50}" srcId="{75DF6D0E-EF2D-4899-8D56-11F561E3DB25}" destId="{22DA92B9-9C40-4A25-8285-966799791BE7}" srcOrd="2" destOrd="0" parTransId="{31A0D76F-F3CA-4A56-BA36-A4E6E0932F46}" sibTransId="{C2D43770-B53D-4E3F-BFD7-DA47BF161F8F}"/>
+    <dgm:cxn modelId="{F6DB5C63-69FA-4FC9-BB9C-7D6AEF8B14EB}" type="presOf" srcId="{EFB0480E-A451-4750-9076-B8DA17ACD683}" destId="{EF322D6C-1CB6-431F-8B42-A64D898D2824}" srcOrd="0" destOrd="1" presId="urn:microsoft.com/office/officeart/2005/8/layout/vList5"/>
+    <dgm:cxn modelId="{BEEC91A6-BF3F-4E21-859A-6D47ACAB8869}" srcId="{A6842990-62A4-4545-B120-1F8AF25A0D6E}" destId="{D66E06A0-8A7E-4EC6-8113-DDE9A8B91FA6}" srcOrd="2" destOrd="0" parTransId="{C867E6D7-68AF-43C6-9E80-BCCDD787550D}" sibTransId="{4B0A02DB-F299-4AF6-A72B-B326FF7FE0BF}"/>
+    <dgm:cxn modelId="{9197056C-C44F-4A04-AEB6-8E23C28CFBCA}" type="presOf" srcId="{D66E06A0-8A7E-4EC6-8113-DDE9A8B91FA6}" destId="{D8CBC06D-2193-488F-8EDE-5FAA991E0B6B}" srcOrd="0" destOrd="0" presId="urn:microsoft.com/office/officeart/2005/8/layout/vList5"/>
+    <dgm:cxn modelId="{9324FDFF-96EF-4D6F-B059-8A767EA02701}" type="presOf" srcId="{051E23BA-27D6-402B-8FD0-643279078F48}" destId="{E36319A3-4DDD-4596-A48B-3AFC2FB82E08}" srcOrd="0" destOrd="1" presId="urn:microsoft.com/office/officeart/2005/8/layout/vList5"/>
+    <dgm:cxn modelId="{61EC2C2C-336E-4152-BF38-E133255426BA}" srcId="{D66E06A0-8A7E-4EC6-8113-DDE9A8B91FA6}" destId="{E08D914F-4215-41A4-8173-F3CBF316F76B}" srcOrd="0" destOrd="0" parTransId="{6E6AFD42-BD05-4248-B472-1EFABC017324}" sibTransId="{1759AAC5-ADE9-4C55-8CBC-F1BA87C7A449}"/>
+    <dgm:cxn modelId="{B844C6F1-2818-4F3A-97BB-A513A7A6487D}" srcId="{0FF8BA2A-500B-413D-8B7A-0FD72A53075A}" destId="{8589F281-C004-49C2-9A17-144391E503DE}" srcOrd="0" destOrd="0" parTransId="{68ACA663-A4B5-4322-A79B-E6FDA765E412}" sibTransId="{C3FF912E-6EAA-40C0-8E91-AAAED8175040}"/>
+    <dgm:cxn modelId="{A7498686-3363-4727-9125-3753C7FB4287}" type="presOf" srcId="{A6842990-62A4-4545-B120-1F8AF25A0D6E}" destId="{C5ED45AB-5708-4618-8F2A-585D84BC9EAD}" srcOrd="0" destOrd="0" presId="urn:microsoft.com/office/officeart/2005/8/layout/vList5"/>
+    <dgm:cxn modelId="{5F5B1E8A-7558-4499-8BC9-E5245219D0BB}" srcId="{D66E06A0-8A7E-4EC6-8113-DDE9A8B91FA6}" destId="{459A1013-0A03-42AB-915D-FC793F5268A6}" srcOrd="2" destOrd="0" parTransId="{8AEAA077-4259-4C23-AD7B-490841F0C203}" sibTransId="{114433D9-7FE6-4491-9053-247CC035F022}"/>
+    <dgm:cxn modelId="{F4DF8B2E-967B-4C23-9FF5-BB008183100C}" type="presOf" srcId="{F1A8E0FB-6830-44B9-AD5D-2C6541803F4D}" destId="{3E606814-09D9-4B4C-8F40-66F312978EEB}" srcOrd="0" destOrd="0" presId="urn:microsoft.com/office/officeart/2005/8/layout/vList5"/>
+    <dgm:cxn modelId="{ACACF1CD-A9C0-4633-8495-72FF45057E3A}" type="presOf" srcId="{7C9DA717-4609-4F35-9627-FBCE587B2E07}" destId="{43C6ABD0-F64A-458E-8A26-0D837897DC64}" srcOrd="0" destOrd="1" presId="urn:microsoft.com/office/officeart/2005/8/layout/vList5"/>
+    <dgm:cxn modelId="{991DC740-DAA8-4D0F-9BAB-A0D216E7CC9C}" srcId="{A6842990-62A4-4545-B120-1F8AF25A0D6E}" destId="{31989D70-38F8-40B4-A5B4-5B64244B04DB}" srcOrd="3" destOrd="0" parTransId="{E572721F-5C44-451C-B622-59B69949FB6F}" sibTransId="{FF3730C5-5E1C-4ACF-986C-1F8BDC2A87DC}"/>
+    <dgm:cxn modelId="{A346880C-19BB-492E-86E8-A5888A7956E2}" srcId="{A6842990-62A4-4545-B120-1F8AF25A0D6E}" destId="{0FF8BA2A-500B-413D-8B7A-0FD72A53075A}" srcOrd="0" destOrd="0" parTransId="{A445CB5E-895F-4150-B184-2C8283752FC5}" sibTransId="{F4903262-3BB8-4A76-A3AA-54C0993BC220}"/>
+    <dgm:cxn modelId="{FC9795E3-DBDF-499A-B2B6-4B8E6CA578BE}" type="presOf" srcId="{E08D914F-4215-41A4-8173-F3CBF316F76B}" destId="{EF322D6C-1CB6-431F-8B42-A64D898D2824}" srcOrd="0" destOrd="0" presId="urn:microsoft.com/office/officeart/2005/8/layout/vList5"/>
     <dgm:cxn modelId="{6D864F09-96B6-4444-95BB-D36241D055AD}" srcId="{A6842990-62A4-4545-B120-1F8AF25A0D6E}" destId="{75DF6D0E-EF2D-4899-8D56-11F561E3DB25}" srcOrd="4" destOrd="0" parTransId="{510C85D3-5932-4392-B61F-F44832C002FA}" sibTransId="{EEE1824F-AA0C-4316-B13D-ED5B6C4A0BFF}"/>
-    <dgm:cxn modelId="{A346880C-19BB-492E-86E8-A5888A7956E2}" srcId="{A6842990-62A4-4545-B120-1F8AF25A0D6E}" destId="{0FF8BA2A-500B-413D-8B7A-0FD72A53075A}" srcOrd="0" destOrd="0" parTransId="{A445CB5E-895F-4150-B184-2C8283752FC5}" sibTransId="{F4903262-3BB8-4A76-A3AA-54C0993BC220}"/>
-    <dgm:cxn modelId="{61EC2C2C-336E-4152-BF38-E133255426BA}" srcId="{D66E06A0-8A7E-4EC6-8113-DDE9A8B91FA6}" destId="{E08D914F-4215-41A4-8173-F3CBF316F76B}" srcOrd="0" destOrd="0" parTransId="{6E6AFD42-BD05-4248-B472-1EFABC017324}" sibTransId="{1759AAC5-ADE9-4C55-8CBC-F1BA87C7A449}"/>
-    <dgm:cxn modelId="{F4DF8B2E-967B-4C23-9FF5-BB008183100C}" type="presOf" srcId="{F1A8E0FB-6830-44B9-AD5D-2C6541803F4D}" destId="{3E606814-09D9-4B4C-8F40-66F312978EEB}" srcOrd="0" destOrd="0" presId="urn:microsoft.com/office/officeart/2005/8/layout/vList5"/>
-    <dgm:cxn modelId="{8122CC33-B4F2-4AA4-9832-D53CD089768C}" type="presOf" srcId="{75DF6D0E-EF2D-4899-8D56-11F561E3DB25}" destId="{C5DBDEB5-64EF-486D-ADE8-9AD2774135B2}" srcOrd="0" destOrd="0" presId="urn:microsoft.com/office/officeart/2005/8/layout/vList5"/>
     <dgm:cxn modelId="{D9C32539-B0FF-4269-910E-8E2F3FB2481A}" type="presOf" srcId="{6DCAF490-84DF-45AB-95F8-850141BC8BDF}" destId="{B35FD520-5FF0-41BD-887C-8B0911FFCB12}" srcOrd="0" destOrd="0" presId="urn:microsoft.com/office/officeart/2005/8/layout/vList5"/>
-    <dgm:cxn modelId="{6D9D5740-A78E-432A-A19B-79A7629DFBD0}" srcId="{F1A8E0FB-6830-44B9-AD5D-2C6541803F4D}" destId="{8A560357-68DD-41D8-841B-C94F1FF7F8C1}" srcOrd="2" destOrd="0" parTransId="{3BC3B257-E716-47FF-9C4E-A1CCC502A26F}" sibTransId="{0F75D6C4-A5C5-4C0B-A3E7-E1F9127F0B24}"/>
-    <dgm:cxn modelId="{991DC740-DAA8-4D0F-9BAB-A0D216E7CC9C}" srcId="{A6842990-62A4-4545-B120-1F8AF25A0D6E}" destId="{31989D70-38F8-40B4-A5B4-5B64244B04DB}" srcOrd="3" destOrd="0" parTransId="{E572721F-5C44-451C-B622-59B69949FB6F}" sibTransId="{FF3730C5-5E1C-4ACF-986C-1F8BDC2A87DC}"/>
+    <dgm:cxn modelId="{66A8234E-E4C2-45FA-965B-ECB6FD1A9659}" type="presOf" srcId="{0EBDD81E-61F5-4638-8D23-E64C5784A7CF}" destId="{E36319A3-4DDD-4596-A48B-3AFC2FB82E08}" srcOrd="0" destOrd="0" presId="urn:microsoft.com/office/officeart/2005/8/layout/vList5"/>
+    <dgm:cxn modelId="{9D250ACB-3782-4169-9513-D5939A72E14C}" srcId="{75DF6D0E-EF2D-4899-8D56-11F561E3DB25}" destId="{051E23BA-27D6-402B-8FD0-643279078F48}" srcOrd="1" destOrd="0" parTransId="{DA361144-F3E9-4156-9CC2-FE98E458196C}" sibTransId="{AE55AD9A-A016-48D5-8B34-AF4339F64545}"/>
     <dgm:cxn modelId="{0652195D-79AA-41CB-A507-64DF25821FDC}" srcId="{75DF6D0E-EF2D-4899-8D56-11F561E3DB25}" destId="{0EBDD81E-61F5-4638-8D23-E64C5784A7CF}" srcOrd="0" destOrd="0" parTransId="{5BB68B6B-2470-4B4F-B825-03319C46AB79}" sibTransId="{91158606-88ED-478A-99A3-FF66895B49FF}"/>
-    <dgm:cxn modelId="{F6DB5C63-69FA-4FC9-BB9C-7D6AEF8B14EB}" type="presOf" srcId="{EFB0480E-A451-4750-9076-B8DA17ACD683}" destId="{EF322D6C-1CB6-431F-8B42-A64D898D2824}" srcOrd="0" destOrd="1" presId="urn:microsoft.com/office/officeart/2005/8/layout/vList5"/>
-    <dgm:cxn modelId="{9197056C-C44F-4A04-AEB6-8E23C28CFBCA}" type="presOf" srcId="{D66E06A0-8A7E-4EC6-8113-DDE9A8B91FA6}" destId="{D8CBC06D-2193-488F-8EDE-5FAA991E0B6B}" srcOrd="0" destOrd="0" presId="urn:microsoft.com/office/officeart/2005/8/layout/vList5"/>
-    <dgm:cxn modelId="{66A8234E-E4C2-45FA-965B-ECB6FD1A9659}" type="presOf" srcId="{0EBDD81E-61F5-4638-8D23-E64C5784A7CF}" destId="{E36319A3-4DDD-4596-A48B-3AFC2FB82E08}" srcOrd="0" destOrd="0" presId="urn:microsoft.com/office/officeart/2005/8/layout/vList5"/>
+    <dgm:cxn modelId="{DA864F5A-43C0-4EAB-ACD8-C653DCDBC285}" srcId="{A6842990-62A4-4545-B120-1F8AF25A0D6E}" destId="{F1A8E0FB-6830-44B9-AD5D-2C6541803F4D}" srcOrd="1" destOrd="0" parTransId="{BA9882FF-0D62-440B-AE35-07B5440B7352}" sibTransId="{BE3BCC92-A824-45B0-AD74-589AA75A91ED}"/>
+    <dgm:cxn modelId="{78B26055-4003-4B61-B1A2-86AC6919F907}" type="presOf" srcId="{22DA92B9-9C40-4A25-8285-966799791BE7}" destId="{E36319A3-4DDD-4596-A48B-3AFC2FB82E08}" srcOrd="0" destOrd="2" presId="urn:microsoft.com/office/officeart/2005/8/layout/vList5"/>
+    <dgm:cxn modelId="{A345E6FB-E582-491A-BAAE-F2A1141E8D26}" type="presOf" srcId="{0FF8BA2A-500B-413D-8B7A-0FD72A53075A}" destId="{FCE31E78-3DAC-4692-A464-D0C835B3F5C0}" srcOrd="0" destOrd="0" presId="urn:microsoft.com/office/officeart/2005/8/layout/vList5"/>
     <dgm:cxn modelId="{F0686254-8BC6-438F-8EFC-387D3C1B4582}" srcId="{D66E06A0-8A7E-4EC6-8113-DDE9A8B91FA6}" destId="{EFB0480E-A451-4750-9076-B8DA17ACD683}" srcOrd="1" destOrd="0" parTransId="{02255FE4-1BB8-44C8-8FC3-2DB4276D8435}" sibTransId="{7ECF0E78-DA31-4B08-B8BA-D36DB4135973}"/>
-    <dgm:cxn modelId="{78B26055-4003-4B61-B1A2-86AC6919F907}" type="presOf" srcId="{22DA92B9-9C40-4A25-8285-966799791BE7}" destId="{E36319A3-4DDD-4596-A48B-3AFC2FB82E08}" srcOrd="0" destOrd="2" presId="urn:microsoft.com/office/officeart/2005/8/layout/vList5"/>
-    <dgm:cxn modelId="{F9E74B76-F3C8-474B-BE2E-672A4119380A}" srcId="{31989D70-38F8-40B4-A5B4-5B64244B04DB}" destId="{07E81225-DE19-4D3E-99CD-FC123A33837F}" srcOrd="0" destOrd="0" parTransId="{642D5DAC-991D-456E-978D-DDF8870668E2}" sibTransId="{71EEF2D0-2FC1-4663-8EEF-F8400FED6EFD}"/>
-    <dgm:cxn modelId="{DA864F5A-43C0-4EAB-ACD8-C653DCDBC285}" srcId="{A6842990-62A4-4545-B120-1F8AF25A0D6E}" destId="{F1A8E0FB-6830-44B9-AD5D-2C6541803F4D}" srcOrd="1" destOrd="0" parTransId="{BA9882FF-0D62-440B-AE35-07B5440B7352}" sibTransId="{BE3BCC92-A824-45B0-AD74-589AA75A91ED}"/>
-    <dgm:cxn modelId="{2178D97F-3CAA-4CEB-BCA2-825BD11AB20F}" type="presOf" srcId="{FFA8810D-171E-4ADC-9CA8-AD57E9D504B9}" destId="{B35FD520-5FF0-41BD-887C-8B0911FFCB12}" srcOrd="0" destOrd="1" presId="urn:microsoft.com/office/officeart/2005/8/layout/vList5"/>
-    <dgm:cxn modelId="{60DB5F81-807B-4DAD-8ED9-6DCE2A60111F}" type="presOf" srcId="{8589F281-C004-49C2-9A17-144391E503DE}" destId="{43C6ABD0-F64A-458E-8A26-0D837897DC64}" srcOrd="0" destOrd="0" presId="urn:microsoft.com/office/officeart/2005/8/layout/vList5"/>
-    <dgm:cxn modelId="{A7498686-3363-4727-9125-3753C7FB4287}" type="presOf" srcId="{A6842990-62A4-4545-B120-1F8AF25A0D6E}" destId="{C5ED45AB-5708-4618-8F2A-585D84BC9EAD}" srcOrd="0" destOrd="0" presId="urn:microsoft.com/office/officeart/2005/8/layout/vList5"/>
-    <dgm:cxn modelId="{220E0694-B595-46BE-BDB9-2B1763BF7F42}" srcId="{0FF8BA2A-500B-413D-8B7A-0FD72A53075A}" destId="{7C9DA717-4609-4F35-9627-FBCE587B2E07}" srcOrd="1" destOrd="0" parTransId="{E5D39B11-6038-4BAB-A377-66C89B23A4FE}" sibTransId="{C70C4ADA-4F3B-4BCA-9873-A32F1BD4BEED}"/>
-    <dgm:cxn modelId="{DB01149F-013B-4AAC-83B8-EA5A02812FB1}" srcId="{F1A8E0FB-6830-44B9-AD5D-2C6541803F4D}" destId="{6DCAF490-84DF-45AB-95F8-850141BC8BDF}" srcOrd="0" destOrd="0" parTransId="{313354FE-947E-4C91-850E-55158EB5406E}" sibTransId="{263CB43B-A0A5-48BB-9C20-6635267C3C22}"/>
-    <dgm:cxn modelId="{BEEC91A6-BF3F-4E21-859A-6D47ACAB8869}" srcId="{A6842990-62A4-4545-B120-1F8AF25A0D6E}" destId="{D66E06A0-8A7E-4EC6-8113-DDE9A8B91FA6}" srcOrd="2" destOrd="0" parTransId="{C867E6D7-68AF-43C6-9E80-BCCDD787550D}" sibTransId="{4B0A02DB-F299-4AF6-A72B-B326FF7FE0BF}"/>
-    <dgm:cxn modelId="{1FC3DAAC-2674-4AC0-A681-6AC6E1E041FE}" type="presOf" srcId="{07E81225-DE19-4D3E-99CD-FC123A33837F}" destId="{DE1FE771-1582-4775-9E8F-B758D933162D}" srcOrd="0" destOrd="0" presId="urn:microsoft.com/office/officeart/2005/8/layout/vList5"/>
-    <dgm:cxn modelId="{E0CB53AF-1846-4839-A817-1BC95F8C73F9}" srcId="{F1A8E0FB-6830-44B9-AD5D-2C6541803F4D}" destId="{FFA8810D-171E-4ADC-9CA8-AD57E9D504B9}" srcOrd="1" destOrd="0" parTransId="{5D65951A-CE03-4794-9B2D-0A910A6F7FFB}" sibTransId="{39C8D19E-6ADE-404A-843B-5F7020E72704}"/>
-    <dgm:cxn modelId="{657DF6AF-D666-4D2C-A115-75BA748559C6}" type="presOf" srcId="{8A560357-68DD-41D8-841B-C94F1FF7F8C1}" destId="{B35FD520-5FF0-41BD-887C-8B0911FFCB12}" srcOrd="0" destOrd="2" presId="urn:microsoft.com/office/officeart/2005/8/layout/vList5"/>
-    <dgm:cxn modelId="{9D250ACB-3782-4169-9513-D5939A72E14C}" srcId="{75DF6D0E-EF2D-4899-8D56-11F561E3DB25}" destId="{051E23BA-27D6-402B-8FD0-643279078F48}" srcOrd="1" destOrd="0" parTransId="{DA361144-F3E9-4156-9CC2-FE98E458196C}" sibTransId="{AE55AD9A-A016-48D5-8B34-AF4339F64545}"/>
-    <dgm:cxn modelId="{ACACF1CD-A9C0-4633-8495-72FF45057E3A}" type="presOf" srcId="{7C9DA717-4609-4F35-9627-FBCE587B2E07}" destId="{43C6ABD0-F64A-458E-8A26-0D837897DC64}" srcOrd="0" destOrd="1" presId="urn:microsoft.com/office/officeart/2005/8/layout/vList5"/>
-    <dgm:cxn modelId="{FC9795E3-DBDF-499A-B2B6-4B8E6CA578BE}" type="presOf" srcId="{E08D914F-4215-41A4-8173-F3CBF316F76B}" destId="{EF322D6C-1CB6-431F-8B42-A64D898D2824}" srcOrd="0" destOrd="0" presId="urn:microsoft.com/office/officeart/2005/8/layout/vList5"/>
-    <dgm:cxn modelId="{B844C6F1-2818-4F3A-97BB-A513A7A6487D}" srcId="{0FF8BA2A-500B-413D-8B7A-0FD72A53075A}" destId="{8589F281-C004-49C2-9A17-144391E503DE}" srcOrd="0" destOrd="0" parTransId="{68ACA663-A4B5-4322-A79B-E6FDA765E412}" sibTransId="{C3FF912E-6EAA-40C0-8E91-AAAED8175040}"/>
-    <dgm:cxn modelId="{A345E6FB-E582-491A-BAAE-F2A1141E8D26}" type="presOf" srcId="{0FF8BA2A-500B-413D-8B7A-0FD72A53075A}" destId="{FCE31E78-3DAC-4692-A464-D0C835B3F5C0}" srcOrd="0" destOrd="0" presId="urn:microsoft.com/office/officeart/2005/8/layout/vList5"/>
-    <dgm:cxn modelId="{DDE004FE-29B7-4A52-86FC-2EB3E9848396}" type="presOf" srcId="{31989D70-38F8-40B4-A5B4-5B64244B04DB}" destId="{C971C0CD-D6D6-4BD2-B517-483DD2B85EA0}" srcOrd="0" destOrd="0" presId="urn:microsoft.com/office/officeart/2005/8/layout/vList5"/>
-    <dgm:cxn modelId="{9324FDFF-96EF-4D6F-B059-8A767EA02701}" type="presOf" srcId="{051E23BA-27D6-402B-8FD0-643279078F48}" destId="{E36319A3-4DDD-4596-A48B-3AFC2FB82E08}" srcOrd="0" destOrd="1" presId="urn:microsoft.com/office/officeart/2005/8/layout/vList5"/>
     <dgm:cxn modelId="{2F1976CB-BC7D-4DA6-86B6-A03B32E37FD5}" type="presParOf" srcId="{C5ED45AB-5708-4618-8F2A-585D84BC9EAD}" destId="{210816C1-7BD4-4E1F-9BAF-45430065939E}" srcOrd="0" destOrd="0" presId="urn:microsoft.com/office/officeart/2005/8/layout/vList5"/>
     <dgm:cxn modelId="{E698788D-62E0-4A5C-AADF-1FCEDABB06F8}" type="presParOf" srcId="{210816C1-7BD4-4E1F-9BAF-45430065939E}" destId="{FCE31E78-3DAC-4692-A464-D0C835B3F5C0}" srcOrd="0" destOrd="0" presId="urn:microsoft.com/office/officeart/2005/8/layout/vList5"/>
     <dgm:cxn modelId="{5008CCE3-5624-4055-8ECB-E1C45F2FC429}" type="presParOf" srcId="{210816C1-7BD4-4E1F-9BAF-45430065939E}" destId="{43C6ABD0-F64A-458E-8A26-0D837897DC64}" srcOrd="1" destOrd="0" presId="urn:microsoft.com/office/officeart/2005/8/layout/vList5"/>
@@ -3375,40 +3415,40 @@
     </dgm:pt>
   </dgm:ptLst>
   <dgm:cxnLst>
-    <dgm:cxn modelId="{824BE007-D8A8-4BC5-A897-8BE1CC7D6DDF}" type="presOf" srcId="{C693AF90-2E67-4389-9BB6-C5D2CAEEC1FF}" destId="{DD756981-072A-4F78-ABC7-E2A848633815}" srcOrd="1" destOrd="0" presId="urn:microsoft.com/office/officeart/2005/8/layout/vList4"/>
-    <dgm:cxn modelId="{128B230A-B289-4CB6-A6AF-E0A33A02F871}" type="presOf" srcId="{64841DF3-12D3-4C8A-A2EA-2845EC9F38D7}" destId="{C195AAFC-E8BF-40C9-B2F5-85621CF3B988}" srcOrd="1" destOrd="0" presId="urn:microsoft.com/office/officeart/2005/8/layout/vList4"/>
+    <dgm:cxn modelId="{7014A16F-3386-4271-823A-1E3479C1A3C3}" type="presOf" srcId="{F29A499B-128E-4ED9-A5CE-D3EC6833A092}" destId="{21FD6BEC-2BE4-4D3B-9A53-4987D8EC21AC}" srcOrd="0" destOrd="0" presId="urn:microsoft.com/office/officeart/2005/8/layout/vList4"/>
+    <dgm:cxn modelId="{6810593D-FC64-4330-BAC8-B050DD661FD7}" type="presOf" srcId="{64841DF3-12D3-4C8A-A2EA-2845EC9F38D7}" destId="{A07D94F9-EF30-4E20-8074-E413B239BE21}" srcOrd="0" destOrd="0" presId="urn:microsoft.com/office/officeart/2005/8/layout/vList4"/>
+    <dgm:cxn modelId="{25B30777-672F-453D-A925-DF4A3A8C0EF6}" type="presOf" srcId="{EA167186-6F53-4DC7-A045-E6417D37BF33}" destId="{5B74900C-2DC2-4F9C-83EA-B674B8C455C3}" srcOrd="0" destOrd="0" presId="urn:microsoft.com/office/officeart/2005/8/layout/vList4"/>
+    <dgm:cxn modelId="{29C867A9-706B-4082-99B1-529CF2AA153D}" type="presOf" srcId="{011E79D2-CE12-4ACC-B4D0-D9E003466911}" destId="{FF945313-E4F2-443C-9640-F8236C883CA0}" srcOrd="1" destOrd="0" presId="urn:microsoft.com/office/officeart/2005/8/layout/vList4"/>
+    <dgm:cxn modelId="{A7E17DD4-E0EF-4403-AB26-19B7F75407DC}" type="presOf" srcId="{F29A499B-128E-4ED9-A5CE-D3EC6833A092}" destId="{98518E50-33B5-489D-8AF9-BC11CE515B19}" srcOrd="1" destOrd="0" presId="urn:microsoft.com/office/officeart/2005/8/layout/vList4"/>
+    <dgm:cxn modelId="{7E99E56C-D01E-44CA-A2A6-B16A3CB3FA6E}" type="presOf" srcId="{CE92E143-7827-4B23-958C-F5E2952926EC}" destId="{24F30434-915D-401A-842A-C3A44E75A979}" srcOrd="0" destOrd="0" presId="urn:microsoft.com/office/officeart/2005/8/layout/vList4"/>
+    <dgm:cxn modelId="{F7E6D72A-5B0B-4536-9DE8-41E4810247B9}" srcId="{8DA69A69-DF68-414D-8EA4-5B891DFFA5AF}" destId="{011E79D2-CE12-4ACC-B4D0-D9E003466911}" srcOrd="5" destOrd="0" parTransId="{29814D48-68C9-4F1B-A742-4632C8E2EA9C}" sibTransId="{46FBF3BF-5D0C-4A35-BF9D-1D6E2F785FEA}"/>
+    <dgm:cxn modelId="{DB6381F9-22D0-4EC2-89ED-F9723FBC122B}" srcId="{8DA69A69-DF68-414D-8EA4-5B891DFFA5AF}" destId="{87EED9D7-F903-415E-8AD5-FBB20E57F17C}" srcOrd="10" destOrd="0" parTransId="{9CF7ABFF-4CAE-47CB-923D-1BC6D6E97E96}" sibTransId="{845A9F58-8459-4120-83F7-C236F902D2A4}"/>
+    <dgm:cxn modelId="{48C0D9DC-8DEF-4A18-A0E2-0A591D1D23D4}" srcId="{8DA69A69-DF68-414D-8EA4-5B891DFFA5AF}" destId="{64841DF3-12D3-4C8A-A2EA-2845EC9F38D7}" srcOrd="8" destOrd="0" parTransId="{A9E857A5-108E-46DC-B1FD-F3877D7A6824}" sibTransId="{063C695B-C458-492E-9DD8-8C80EDD037E4}"/>
+    <dgm:cxn modelId="{FADBC256-B53A-4253-82DD-D9B3730AA1EC}" type="presOf" srcId="{01BDD74D-C028-4813-9A40-60C9E2F57DB0}" destId="{28517874-F162-4DF2-9EB3-F83C7A652985}" srcOrd="1" destOrd="0" presId="urn:microsoft.com/office/officeart/2005/8/layout/vList4"/>
+    <dgm:cxn modelId="{837E456E-152E-40BC-BEB1-7C6227FC233C}" type="presOf" srcId="{01BDD74D-C028-4813-9A40-60C9E2F57DB0}" destId="{38C1AABC-2A80-4D18-AB70-CD76795B5F08}" srcOrd="0" destOrd="0" presId="urn:microsoft.com/office/officeart/2005/8/layout/vList4"/>
+    <dgm:cxn modelId="{E9CD9087-4D76-4DCC-976E-CEF58E4BDA7B}" srcId="{8DA69A69-DF68-414D-8EA4-5B891DFFA5AF}" destId="{01BDD74D-C028-4813-9A40-60C9E2F57DB0}" srcOrd="0" destOrd="0" parTransId="{B1B801B5-C3BE-4F62-9805-943F9ECCC34B}" sibTransId="{F35B3DDF-F275-4912-BB0B-8814AF11EBD0}"/>
     <dgm:cxn modelId="{DCC80B1A-4E1A-41D5-958B-E5CD639B1B0D}" type="presOf" srcId="{C693AF90-2E67-4389-9BB6-C5D2CAEEC1FF}" destId="{0663B67C-F1DA-4AE8-B977-A72746B0B55A}" srcOrd="0" destOrd="0" presId="urn:microsoft.com/office/officeart/2005/8/layout/vList4"/>
-    <dgm:cxn modelId="{705C021B-4DD7-4E5D-89C9-EDEBD5F17379}" type="presOf" srcId="{CE92E143-7827-4B23-958C-F5E2952926EC}" destId="{BE359720-3DA6-45D3-B11C-BC16643AE4C6}" srcOrd="1" destOrd="0" presId="urn:microsoft.com/office/officeart/2005/8/layout/vList4"/>
-    <dgm:cxn modelId="{F7E6D72A-5B0B-4536-9DE8-41E4810247B9}" srcId="{8DA69A69-DF68-414D-8EA4-5B891DFFA5AF}" destId="{011E79D2-CE12-4ACC-B4D0-D9E003466911}" srcOrd="5" destOrd="0" parTransId="{29814D48-68C9-4F1B-A742-4632C8E2EA9C}" sibTransId="{46FBF3BF-5D0C-4A35-BF9D-1D6E2F785FEA}"/>
+    <dgm:cxn modelId="{3E7B37FE-1F03-4B51-8A7C-5C8D70514817}" type="presOf" srcId="{A7635277-B6AF-417B-AB49-E517FD333C49}" destId="{AF33F1AF-16D3-496F-A982-1F3CBCF4FF8E}" srcOrd="1" destOrd="0" presId="urn:microsoft.com/office/officeart/2005/8/layout/vList4"/>
+    <dgm:cxn modelId="{262F509B-DD73-42F9-9BA8-435A6AFF57F4}" type="presOf" srcId="{AB393BA1-5855-49E3-9B86-59C4B29CEA69}" destId="{9D8C2DA9-47A7-491C-9512-DC63D526E7DA}" srcOrd="1" destOrd="0" presId="urn:microsoft.com/office/officeart/2005/8/layout/vList4"/>
+    <dgm:cxn modelId="{462546E9-5FC3-417D-9427-DDC067EFBA53}" type="presOf" srcId="{8DA69A69-DF68-414D-8EA4-5B891DFFA5AF}" destId="{3245D8A3-8E5E-4370-9560-7D50F08D1AAC}" srcOrd="0" destOrd="0" presId="urn:microsoft.com/office/officeart/2005/8/layout/vList4"/>
+    <dgm:cxn modelId="{8A6687E5-21B2-435D-B10C-332268480112}" srcId="{8DA69A69-DF68-414D-8EA4-5B891DFFA5AF}" destId="{EA167186-6F53-4DC7-A045-E6417D37BF33}" srcOrd="3" destOrd="0" parTransId="{AA45AC8D-893E-49DB-8316-613BBB5646B5}" sibTransId="{9FE0364B-209B-4506-9049-4401EA19AFBC}"/>
+    <dgm:cxn modelId="{8D5B359C-D9E7-4132-8320-19453F90DDBD}" type="presOf" srcId="{A7635277-B6AF-417B-AB49-E517FD333C49}" destId="{5409D7A6-CC75-4C85-8991-EB5D7E28A32C}" srcOrd="0" destOrd="0" presId="urn:microsoft.com/office/officeart/2005/8/layout/vList4"/>
+    <dgm:cxn modelId="{77186B5F-C2E3-45CC-B1DA-3307947B8E66}" type="presOf" srcId="{011E79D2-CE12-4ACC-B4D0-D9E003466911}" destId="{0451AC9A-80EA-4040-A601-D0B64C634769}" srcOrd="0" destOrd="0" presId="urn:microsoft.com/office/officeart/2005/8/layout/vList4"/>
+    <dgm:cxn modelId="{201FA9D4-3A6B-489F-B035-67218D0EF8D5}" srcId="{8DA69A69-DF68-414D-8EA4-5B891DFFA5AF}" destId="{F29A499B-128E-4ED9-A5CE-D3EC6833A092}" srcOrd="9" destOrd="0" parTransId="{CDD56826-666D-4326-B961-511482B1AE98}" sibTransId="{34E1B6F7-AFA1-45F6-B66D-CE24B6F4F3E6}"/>
     <dgm:cxn modelId="{6C569132-71B0-4D77-BA25-C5457021688A}" srcId="{8DA69A69-DF68-414D-8EA4-5B891DFFA5AF}" destId="{B1A5E10D-28EF-4A53-BB42-ADFCEDD33914}" srcOrd="1" destOrd="0" parTransId="{4330C9E9-E525-4CE3-8D83-79DC3A7B548F}" sibTransId="{EE6CE372-F5B4-4C65-BB47-2D0CBB1D465F}"/>
-    <dgm:cxn modelId="{6810593D-FC64-4330-BAC8-B050DD661FD7}" type="presOf" srcId="{64841DF3-12D3-4C8A-A2EA-2845EC9F38D7}" destId="{A07D94F9-EF30-4E20-8074-E413B239BE21}" srcOrd="0" destOrd="0" presId="urn:microsoft.com/office/officeart/2005/8/layout/vList4"/>
-    <dgm:cxn modelId="{77186B5F-C2E3-45CC-B1DA-3307947B8E66}" type="presOf" srcId="{011E79D2-CE12-4ACC-B4D0-D9E003466911}" destId="{0451AC9A-80EA-4040-A601-D0B64C634769}" srcOrd="0" destOrd="0" presId="urn:microsoft.com/office/officeart/2005/8/layout/vList4"/>
-    <dgm:cxn modelId="{E8D64E65-62F1-48F0-A7F4-ECB5F990C6DE}" type="presOf" srcId="{EA167186-6F53-4DC7-A045-E6417D37BF33}" destId="{D2600429-E556-46F6-80E8-880C4820F655}" srcOrd="1" destOrd="0" presId="urn:microsoft.com/office/officeart/2005/8/layout/vList4"/>
-    <dgm:cxn modelId="{7E99E56C-D01E-44CA-A2A6-B16A3CB3FA6E}" type="presOf" srcId="{CE92E143-7827-4B23-958C-F5E2952926EC}" destId="{24F30434-915D-401A-842A-C3A44E75A979}" srcOrd="0" destOrd="0" presId="urn:microsoft.com/office/officeart/2005/8/layout/vList4"/>
-    <dgm:cxn modelId="{837E456E-152E-40BC-BEB1-7C6227FC233C}" type="presOf" srcId="{01BDD74D-C028-4813-9A40-60C9E2F57DB0}" destId="{38C1AABC-2A80-4D18-AB70-CD76795B5F08}" srcOrd="0" destOrd="0" presId="urn:microsoft.com/office/officeart/2005/8/layout/vList4"/>
-    <dgm:cxn modelId="{7014A16F-3386-4271-823A-1E3479C1A3C3}" type="presOf" srcId="{F29A499B-128E-4ED9-A5CE-D3EC6833A092}" destId="{21FD6BEC-2BE4-4D3B-9A53-4987D8EC21AC}" srcOrd="0" destOrd="0" presId="urn:microsoft.com/office/officeart/2005/8/layout/vList4"/>
-    <dgm:cxn modelId="{BF22BE76-DB17-4A7C-9C6A-6A21FB3D184F}" type="presOf" srcId="{AB393BA1-5855-49E3-9B86-59C4B29CEA69}" destId="{B3A218B0-FF83-4B81-B386-3F5787FB84AE}" srcOrd="0" destOrd="0" presId="urn:microsoft.com/office/officeart/2005/8/layout/vList4"/>
-    <dgm:cxn modelId="{FADBC256-B53A-4253-82DD-D9B3730AA1EC}" type="presOf" srcId="{01BDD74D-C028-4813-9A40-60C9E2F57DB0}" destId="{28517874-F162-4DF2-9EB3-F83C7A652985}" srcOrd="1" destOrd="0" presId="urn:microsoft.com/office/officeart/2005/8/layout/vList4"/>
-    <dgm:cxn modelId="{25B30777-672F-453D-A925-DF4A3A8C0EF6}" type="presOf" srcId="{EA167186-6F53-4DC7-A045-E6417D37BF33}" destId="{5B74900C-2DC2-4F9C-83EA-B674B8C455C3}" srcOrd="0" destOrd="0" presId="urn:microsoft.com/office/officeart/2005/8/layout/vList4"/>
-    <dgm:cxn modelId="{A38FB077-A8D7-40C2-A916-B9A2D88691E7}" type="presOf" srcId="{B1A5E10D-28EF-4A53-BB42-ADFCEDD33914}" destId="{1A6920FE-A97C-4482-AA47-1D4A8C2D730F}" srcOrd="1" destOrd="0" presId="urn:microsoft.com/office/officeart/2005/8/layout/vList4"/>
-    <dgm:cxn modelId="{E9CD9087-4D76-4DCC-976E-CEF58E4BDA7B}" srcId="{8DA69A69-DF68-414D-8EA4-5B891DFFA5AF}" destId="{01BDD74D-C028-4813-9A40-60C9E2F57DB0}" srcOrd="0" destOrd="0" parTransId="{B1B801B5-C3BE-4F62-9805-943F9ECCC34B}" sibTransId="{F35B3DDF-F275-4912-BB0B-8814AF11EBD0}"/>
-    <dgm:cxn modelId="{262F509B-DD73-42F9-9BA8-435A6AFF57F4}" type="presOf" srcId="{AB393BA1-5855-49E3-9B86-59C4B29CEA69}" destId="{9D8C2DA9-47A7-491C-9512-DC63D526E7DA}" srcOrd="1" destOrd="0" presId="urn:microsoft.com/office/officeart/2005/8/layout/vList4"/>
-    <dgm:cxn modelId="{8D5B359C-D9E7-4132-8320-19453F90DDBD}" type="presOf" srcId="{A7635277-B6AF-417B-AB49-E517FD333C49}" destId="{5409D7A6-CC75-4C85-8991-EB5D7E28A32C}" srcOrd="0" destOrd="0" presId="urn:microsoft.com/office/officeart/2005/8/layout/vList4"/>
-    <dgm:cxn modelId="{16E582A8-0239-4002-981C-4F30902CDCB6}" type="presOf" srcId="{87EED9D7-F903-415E-8AD5-FBB20E57F17C}" destId="{19D75B96-0BDF-4D45-9CDA-670E68961379}" srcOrd="0" destOrd="0" presId="urn:microsoft.com/office/officeart/2005/8/layout/vList4"/>
-    <dgm:cxn modelId="{047C46A9-F2CD-4146-951F-467E5F8CB8ED}" srcId="{8DA69A69-DF68-414D-8EA4-5B891DFFA5AF}" destId="{CE92E143-7827-4B23-958C-F5E2952926EC}" srcOrd="4" destOrd="0" parTransId="{C4D32C04-360F-4F8D-8B67-B5640F4A6D8F}" sibTransId="{9E9FB500-C656-4896-8D25-03917B48704C}"/>
-    <dgm:cxn modelId="{29C867A9-706B-4082-99B1-529CF2AA153D}" type="presOf" srcId="{011E79D2-CE12-4ACC-B4D0-D9E003466911}" destId="{FF945313-E4F2-443C-9640-F8236C883CA0}" srcOrd="1" destOrd="0" presId="urn:microsoft.com/office/officeart/2005/8/layout/vList4"/>
+    <dgm:cxn modelId="{3F70E3EC-8DAA-43A9-9201-E83ACE16E279}" type="presOf" srcId="{B1A5E10D-28EF-4A53-BB42-ADFCEDD33914}" destId="{72FDBD55-6070-4E85-AA3A-6F7522DCF49F}" srcOrd="0" destOrd="0" presId="urn:microsoft.com/office/officeart/2005/8/layout/vList4"/>
     <dgm:cxn modelId="{C1692AC0-BA0F-45DE-B396-12372577650D}" srcId="{8DA69A69-DF68-414D-8EA4-5B891DFFA5AF}" destId="{C693AF90-2E67-4389-9BB6-C5D2CAEEC1FF}" srcOrd="7" destOrd="0" parTransId="{00079A4F-B938-401D-9474-8F2025C874A4}" sibTransId="{D443B56A-500B-4402-B1F6-0F52B8475755}"/>
     <dgm:cxn modelId="{54181BCC-794E-4A3F-B69C-66358F54999E}" type="presOf" srcId="{87EED9D7-F903-415E-8AD5-FBB20E57F17C}" destId="{19010068-538E-4E7A-921F-CCE3278EC84F}" srcOrd="1" destOrd="0" presId="urn:microsoft.com/office/officeart/2005/8/layout/vList4"/>
-    <dgm:cxn modelId="{A7E17DD4-E0EF-4403-AB26-19B7F75407DC}" type="presOf" srcId="{F29A499B-128E-4ED9-A5CE-D3EC6833A092}" destId="{98518E50-33B5-489D-8AF9-BC11CE515B19}" srcOrd="1" destOrd="0" presId="urn:microsoft.com/office/officeart/2005/8/layout/vList4"/>
-    <dgm:cxn modelId="{201FA9D4-3A6B-489F-B035-67218D0EF8D5}" srcId="{8DA69A69-DF68-414D-8EA4-5B891DFFA5AF}" destId="{F29A499B-128E-4ED9-A5CE-D3EC6833A092}" srcOrd="9" destOrd="0" parTransId="{CDD56826-666D-4326-B961-511482B1AE98}" sibTransId="{34E1B6F7-AFA1-45F6-B66D-CE24B6F4F3E6}"/>
+    <dgm:cxn modelId="{A38FB077-A8D7-40C2-A916-B9A2D88691E7}" type="presOf" srcId="{B1A5E10D-28EF-4A53-BB42-ADFCEDD33914}" destId="{1A6920FE-A97C-4482-AA47-1D4A8C2D730F}" srcOrd="1" destOrd="0" presId="urn:microsoft.com/office/officeart/2005/8/layout/vList4"/>
+    <dgm:cxn modelId="{BF22BE76-DB17-4A7C-9C6A-6A21FB3D184F}" type="presOf" srcId="{AB393BA1-5855-49E3-9B86-59C4B29CEA69}" destId="{B3A218B0-FF83-4B81-B386-3F5787FB84AE}" srcOrd="0" destOrd="0" presId="urn:microsoft.com/office/officeart/2005/8/layout/vList4"/>
+    <dgm:cxn modelId="{128B230A-B289-4CB6-A6AF-E0A33A02F871}" type="presOf" srcId="{64841DF3-12D3-4C8A-A2EA-2845EC9F38D7}" destId="{C195AAFC-E8BF-40C9-B2F5-85621CF3B988}" srcOrd="1" destOrd="0" presId="urn:microsoft.com/office/officeart/2005/8/layout/vList4"/>
     <dgm:cxn modelId="{F3ED81DC-2C51-47EE-A31F-B6E976CD6458}" srcId="{8DA69A69-DF68-414D-8EA4-5B891DFFA5AF}" destId="{AB393BA1-5855-49E3-9B86-59C4B29CEA69}" srcOrd="2" destOrd="0" parTransId="{FB136A78-F087-494B-A4DD-4AF3EF01BF04}" sibTransId="{CFE1A1C0-1939-44E8-B395-EE878B1AED03}"/>
-    <dgm:cxn modelId="{48C0D9DC-8DEF-4A18-A0E2-0A591D1D23D4}" srcId="{8DA69A69-DF68-414D-8EA4-5B891DFFA5AF}" destId="{64841DF3-12D3-4C8A-A2EA-2845EC9F38D7}" srcOrd="8" destOrd="0" parTransId="{A9E857A5-108E-46DC-B1FD-F3877D7A6824}" sibTransId="{063C695B-C458-492E-9DD8-8C80EDD037E4}"/>
+    <dgm:cxn modelId="{705C021B-4DD7-4E5D-89C9-EDEBD5F17379}" type="presOf" srcId="{CE92E143-7827-4B23-958C-F5E2952926EC}" destId="{BE359720-3DA6-45D3-B11C-BC16643AE4C6}" srcOrd="1" destOrd="0" presId="urn:microsoft.com/office/officeart/2005/8/layout/vList4"/>
+    <dgm:cxn modelId="{824BE007-D8A8-4BC5-A897-8BE1CC7D6DDF}" type="presOf" srcId="{C693AF90-2E67-4389-9BB6-C5D2CAEEC1FF}" destId="{DD756981-072A-4F78-ABC7-E2A848633815}" srcOrd="1" destOrd="0" presId="urn:microsoft.com/office/officeart/2005/8/layout/vList4"/>
+    <dgm:cxn modelId="{16E582A8-0239-4002-981C-4F30902CDCB6}" type="presOf" srcId="{87EED9D7-F903-415E-8AD5-FBB20E57F17C}" destId="{19D75B96-0BDF-4D45-9CDA-670E68961379}" srcOrd="0" destOrd="0" presId="urn:microsoft.com/office/officeart/2005/8/layout/vList4"/>
+    <dgm:cxn modelId="{E8D64E65-62F1-48F0-A7F4-ECB5F990C6DE}" type="presOf" srcId="{EA167186-6F53-4DC7-A045-E6417D37BF33}" destId="{D2600429-E556-46F6-80E8-880C4820F655}" srcOrd="1" destOrd="0" presId="urn:microsoft.com/office/officeart/2005/8/layout/vList4"/>
+    <dgm:cxn modelId="{047C46A9-F2CD-4146-951F-467E5F8CB8ED}" srcId="{8DA69A69-DF68-414D-8EA4-5B891DFFA5AF}" destId="{CE92E143-7827-4B23-958C-F5E2952926EC}" srcOrd="4" destOrd="0" parTransId="{C4D32C04-360F-4F8D-8B67-B5640F4A6D8F}" sibTransId="{9E9FB500-C656-4896-8D25-03917B48704C}"/>
     <dgm:cxn modelId="{876943E5-6311-4C46-B02D-095CFB15C899}" srcId="{8DA69A69-DF68-414D-8EA4-5B891DFFA5AF}" destId="{A7635277-B6AF-417B-AB49-E517FD333C49}" srcOrd="6" destOrd="0" parTransId="{C477E470-852C-42A8-B063-8341FC3C990C}" sibTransId="{71F53B31-01A5-4EDB-848A-6A0AD6C5A84A}"/>
-    <dgm:cxn modelId="{8A6687E5-21B2-435D-B10C-332268480112}" srcId="{8DA69A69-DF68-414D-8EA4-5B891DFFA5AF}" destId="{EA167186-6F53-4DC7-A045-E6417D37BF33}" srcOrd="3" destOrd="0" parTransId="{AA45AC8D-893E-49DB-8316-613BBB5646B5}" sibTransId="{9FE0364B-209B-4506-9049-4401EA19AFBC}"/>
-    <dgm:cxn modelId="{462546E9-5FC3-417D-9427-DDC067EFBA53}" type="presOf" srcId="{8DA69A69-DF68-414D-8EA4-5B891DFFA5AF}" destId="{3245D8A3-8E5E-4370-9560-7D50F08D1AAC}" srcOrd="0" destOrd="0" presId="urn:microsoft.com/office/officeart/2005/8/layout/vList4"/>
-    <dgm:cxn modelId="{3F70E3EC-8DAA-43A9-9201-E83ACE16E279}" type="presOf" srcId="{B1A5E10D-28EF-4A53-BB42-ADFCEDD33914}" destId="{72FDBD55-6070-4E85-AA3A-6F7522DCF49F}" srcOrd="0" destOrd="0" presId="urn:microsoft.com/office/officeart/2005/8/layout/vList4"/>
-    <dgm:cxn modelId="{DB6381F9-22D0-4EC2-89ED-F9723FBC122B}" srcId="{8DA69A69-DF68-414D-8EA4-5B891DFFA5AF}" destId="{87EED9D7-F903-415E-8AD5-FBB20E57F17C}" srcOrd="10" destOrd="0" parTransId="{9CF7ABFF-4CAE-47CB-923D-1BC6D6E97E96}" sibTransId="{845A9F58-8459-4120-83F7-C236F902D2A4}"/>
-    <dgm:cxn modelId="{3E7B37FE-1F03-4B51-8A7C-5C8D70514817}" type="presOf" srcId="{A7635277-B6AF-417B-AB49-E517FD333C49}" destId="{AF33F1AF-16D3-496F-A982-1F3CBCF4FF8E}" srcOrd="1" destOrd="0" presId="urn:microsoft.com/office/officeart/2005/8/layout/vList4"/>
     <dgm:cxn modelId="{B3C88914-B663-4D88-A984-53C0250FD5C5}" type="presParOf" srcId="{3245D8A3-8E5E-4370-9560-7D50F08D1AAC}" destId="{591064D2-3FD8-4EBB-A7F6-6190915D84B9}" srcOrd="0" destOrd="0" presId="urn:microsoft.com/office/officeart/2005/8/layout/vList4"/>
     <dgm:cxn modelId="{574EADAF-8F63-40AA-AA0F-59CAD1AD1AA3}" type="presParOf" srcId="{591064D2-3FD8-4EBB-A7F6-6190915D84B9}" destId="{38C1AABC-2A80-4D18-AB70-CD76795B5F08}" srcOrd="0" destOrd="0" presId="urn:microsoft.com/office/officeart/2005/8/layout/vList4"/>
     <dgm:cxn modelId="{BC1BED41-3394-419A-9D43-3FA1CFB12F76}" type="presParOf" srcId="{591064D2-3FD8-4EBB-A7F6-6190915D84B9}" destId="{36A321AB-B414-459A-92C0-C559ED15EF30}" srcOrd="1" destOrd="0" presId="urn:microsoft.com/office/officeart/2005/8/layout/vList4"/>
@@ -3955,6 +3995,26 @@
               <a:latin typeface="+mj-lt"/>
             </a:rPr>
             <a:t>Create and Train Model</a:t>
+          </a:r>
+        </a:p>
+        <a:p>
+          <a:pPr marL="228600" lvl="1" indent="-228600" algn="l" defTabSz="889000">
+            <a:lnSpc>
+              <a:spcPct val="90000"/>
+            </a:lnSpc>
+            <a:spcBef>
+              <a:spcPct val="0"/>
+            </a:spcBef>
+            <a:spcAft>
+              <a:spcPct val="15000"/>
+            </a:spcAft>
+            <a:buChar char="•"/>
+          </a:pPr>
+          <a:r>
+            <a:rPr lang="en-US" sz="2000" kern="1200" dirty="0">
+              <a:latin typeface="+mj-lt"/>
+            </a:rPr>
+            <a:t>Evaluation</a:t>
           </a:r>
         </a:p>
       </dsp:txBody>
@@ -8420,7 +8480,7 @@
               <a:rPr lang="en-US" smtClean="0">
                 <a:latin typeface="Segoe UI" pitchFamily="34" charset="0"/>
               </a:rPr>
-              <a:t>3/5/2017 6:24 AM</a:t>
+              <a:t>3/27/2017 7:05 AM</a:t>
             </a:fld>
             <a:endParaRPr lang="en-US" dirty="0">
               <a:latin typeface="Segoe UI" pitchFamily="34" charset="0"/>
@@ -11554,18 +11614,12 @@
               <a:buAutoNum type="arabicPeriod"/>
             </a:pPr>
             <a:r>
-              <a:rPr lang="en-US" sz="1800" baseline="0" dirty="0"/>
-              <a:t>Understand feature selection</a:t>
+              <a:rPr lang="en-US" sz="1800" baseline="0"/>
+              <a:t>Understand </a:t>
             </a:r>
-          </a:p>
-          <a:p>
-            <a:pPr marL="445862" lvl="1" indent="-228600">
-              <a:buFont typeface="+mj-lt"/>
-              <a:buAutoNum type="arabicPeriod"/>
-            </a:pPr>
             <a:r>
               <a:rPr lang="en-US" sz="1800" baseline="0" dirty="0"/>
-              <a:t>Understand Azure Storage Options</a:t>
+              <a:t>Azure Storage Options</a:t>
             </a:r>
           </a:p>
           <a:p>
@@ -11932,10 +11986,9 @@
           <a:lstStyle/>
           <a:p>
             <a:r>
-              <a:rPr lang="en-US" sz="1800"/>
+              <a:rPr lang="en-US" sz="1800" dirty="0"/>
               <a:t>Questions?</a:t>
             </a:r>
-            <a:endParaRPr lang="en-US" sz="1800" dirty="0"/>
           </a:p>
         </p:txBody>
       </p:sp>
@@ -12272,7 +12325,25 @@
               <a:rPr lang="en-US" sz="1800" baseline="0" dirty="0"/>
               <a:t> management and monitor</a:t>
             </a:r>
-            <a:endParaRPr lang="en-US" sz="1800" dirty="0"/>
+          </a:p>
+          <a:p>
+            <a:pPr marL="228600" indent="-228600">
+              <a:buFont typeface="+mj-lt"/>
+              <a:buAutoNum type="arabicPeriod"/>
+            </a:pPr>
+            <a:r>
+              <a:rPr lang="en-US" sz="1800" dirty="0"/>
+              <a:t>A</a:t>
+            </a:r>
+            <a:r>
+              <a:rPr lang="en-US" sz="1800" baseline="0" dirty="0"/>
+              <a:t> great resource for a team involved in data science to get started: </a:t>
+            </a:r>
+            <a:r>
+              <a:rPr lang="en-US" sz="1800" u="sng" dirty="0"/>
+              <a:t>https://github.com/Azure/Microsoft-TDSP</a:t>
+            </a:r>
+            <a:endParaRPr lang="en-US" sz="1800" u="sng" dirty="0"/>
           </a:p>
           <a:p>
             <a:pPr marL="228600" indent="-228600">
@@ -13180,9 +13251,12 @@
           <a:bodyPr/>
           <a:lstStyle/>
           <a:p>
+            <a:pPr marL="342900" indent="-342900">
+              <a:buAutoNum type="arabicPeriod"/>
+            </a:pPr>
             <a:r>
               <a:rPr lang="en-US" sz="1600" dirty="0"/>
-              <a:t>1.  In reference to machine</a:t>
+              <a:t>In reference to machine</a:t>
             </a:r>
             <a:r>
               <a:rPr lang="en-US" sz="1600" baseline="0" dirty="0"/>
@@ -13198,6 +13272,28 @@
               <a:rPr lang="en-US" sz="1600" baseline="0" dirty="0"/>
               <a:t> </a:t>
             </a:r>
+          </a:p>
+          <a:p>
+            <a:pPr marL="342900" indent="-342900">
+              <a:buAutoNum type="arabicPeriod"/>
+            </a:pPr>
+            <a:r>
+              <a:rPr lang="en-US" sz="1600" baseline="0" dirty="0"/>
+              <a:t>Great whitepaper on preprocessing data in R and important questions to ask: </a:t>
+            </a:r>
+            <a:r>
+              <a:rPr lang="en-US" sz="1600" u="sng" baseline="0" dirty="0">
+                <a:solidFill>
+                  <a:schemeClr val="accent2"/>
+                </a:solidFill>
+              </a:rPr>
+              <a:t>https://info.microsoft.com/rs/157-GQE-382/images/EN-CNTNT-Whitepaper-Data-Prep-Using-R.pdf</a:t>
+            </a:r>
+          </a:p>
+          <a:p>
+            <a:pPr marL="342900" indent="-342900">
+              <a:buAutoNum type="arabicPeriod"/>
+            </a:pPr>
             <a:endParaRPr lang="en-US" sz="1600" dirty="0"/>
           </a:p>
         </p:txBody>
@@ -18179,7 +18275,7 @@
           <a:p>
             <a:fld id="{93C52C2B-7042-40BF-8872-17B0983F4A66}" type="datetimeFigureOut">
               <a:rPr lang="en-US" smtClean="0"/>
-              <a:t>3/5/2017</a:t>
+              <a:t>3/27/2017</a:t>
             </a:fld>
             <a:endParaRPr lang="en-US"/>
           </a:p>
@@ -18347,7 +18443,7 @@
           <a:p>
             <a:fld id="{93C52C2B-7042-40BF-8872-17B0983F4A66}" type="datetimeFigureOut">
               <a:rPr lang="en-US" smtClean="0"/>
-              <a:t>3/5/2017</a:t>
+              <a:t>3/27/2017</a:t>
             </a:fld>
             <a:endParaRPr lang="en-US"/>
           </a:p>
@@ -18592,7 +18688,7 @@
           <a:p>
             <a:fld id="{93C52C2B-7042-40BF-8872-17B0983F4A66}" type="datetimeFigureOut">
               <a:rPr lang="en-US" smtClean="0"/>
-              <a:t>3/5/2017</a:t>
+              <a:t>3/27/2017</a:t>
             </a:fld>
             <a:endParaRPr lang="en-US"/>
           </a:p>
@@ -18854,7 +18950,7 @@
           <a:p>
             <a:fld id="{93C52C2B-7042-40BF-8872-17B0983F4A66}" type="datetimeFigureOut">
               <a:rPr lang="en-US" smtClean="0"/>
-              <a:t>3/5/2017</a:t>
+              <a:t>3/27/2017</a:t>
             </a:fld>
             <a:endParaRPr lang="en-US"/>
           </a:p>
@@ -19218,7 +19314,7 @@
           <a:p>
             <a:fld id="{93C52C2B-7042-40BF-8872-17B0983F4A66}" type="datetimeFigureOut">
               <a:rPr lang="en-US" smtClean="0"/>
-              <a:t>3/5/2017</a:t>
+              <a:t>3/27/2017</a:t>
             </a:fld>
             <a:endParaRPr lang="en-US"/>
           </a:p>
@@ -19335,7 +19431,7 @@
           <a:p>
             <a:fld id="{93C52C2B-7042-40BF-8872-17B0983F4A66}" type="datetimeFigureOut">
               <a:rPr lang="en-US" smtClean="0"/>
-              <a:t>3/5/2017</a:t>
+              <a:t>3/27/2017</a:t>
             </a:fld>
             <a:endParaRPr lang="en-US"/>
           </a:p>
@@ -19430,7 +19526,7 @@
           <a:p>
             <a:fld id="{93C52C2B-7042-40BF-8872-17B0983F4A66}" type="datetimeFigureOut">
               <a:rPr lang="en-US" smtClean="0"/>
-              <a:t>3/5/2017</a:t>
+              <a:t>3/27/2017</a:t>
             </a:fld>
             <a:endParaRPr lang="en-US"/>
           </a:p>
@@ -19705,7 +19801,7 @@
           <a:p>
             <a:fld id="{93C52C2B-7042-40BF-8872-17B0983F4A66}" type="datetimeFigureOut">
               <a:rPr lang="en-US" smtClean="0"/>
-              <a:t>3/5/2017</a:t>
+              <a:t>3/27/2017</a:t>
             </a:fld>
             <a:endParaRPr lang="en-US"/>
           </a:p>
@@ -19957,7 +20053,7 @@
           <a:p>
             <a:fld id="{93C52C2B-7042-40BF-8872-17B0983F4A66}" type="datetimeFigureOut">
               <a:rPr lang="en-US" smtClean="0"/>
-              <a:t>3/5/2017</a:t>
+              <a:t>3/27/2017</a:t>
             </a:fld>
             <a:endParaRPr lang="en-US"/>
           </a:p>
@@ -20125,7 +20221,7 @@
           <a:p>
             <a:fld id="{93C52C2B-7042-40BF-8872-17B0983F4A66}" type="datetimeFigureOut">
               <a:rPr lang="en-US" smtClean="0"/>
-              <a:t>3/5/2017</a:t>
+              <a:t>3/27/2017</a:t>
             </a:fld>
             <a:endParaRPr lang="en-US"/>
           </a:p>
@@ -20303,7 +20399,7 @@
           <a:p>
             <a:fld id="{93C52C2B-7042-40BF-8872-17B0983F4A66}" type="datetimeFigureOut">
               <a:rPr lang="en-US" smtClean="0"/>
-              <a:t>3/5/2017</a:t>
+              <a:t>3/27/2017</a:t>
             </a:fld>
             <a:endParaRPr lang="en-US"/>
           </a:p>
@@ -22252,7 +22348,7 @@
           <a:p>
             <a:fld id="{93C52C2B-7042-40BF-8872-17B0983F4A66}" type="datetimeFigureOut">
               <a:rPr lang="en-US" smtClean="0"/>
-              <a:t>3/5/2017</a:t>
+              <a:t>3/27/2017</a:t>
             </a:fld>
             <a:endParaRPr lang="en-US"/>
           </a:p>
@@ -24437,7 +24533,7 @@
           <a:graphicData uri="http://schemas.openxmlformats.org/presentationml/2006/ole">
             <mc:AlternateContent xmlns:mc="http://schemas.openxmlformats.org/markup-compatibility/2006">
               <mc:Choice xmlns:v="urn:schemas-microsoft-com:vml" Requires="v">
-                <p:oleObj spid="_x0000_s1026" name="think-cell Slide" r:id="rId17" imgW="383" imgH="384" progId="TCLayout.ActiveDocument.1">
+                <p:oleObj spid="_x0000_s1033" name="think-cell Slide" r:id="rId17" imgW="383" imgH="384" progId="TCLayout.ActiveDocument.1">
                   <p:embed/>
                 </p:oleObj>
               </mc:Choice>
@@ -25250,7 +25346,7 @@
           <a:p>
             <a:fld id="{93C52C2B-7042-40BF-8872-17B0983F4A66}" type="datetimeFigureOut">
               <a:rPr lang="en-US" smtClean="0"/>
-              <a:t>3/5/2017</a:t>
+              <a:t>3/27/2017</a:t>
             </a:fld>
             <a:endParaRPr lang="en-US"/>
           </a:p>
@@ -26308,7 +26404,7 @@
           <a:graphicData uri="http://schemas.openxmlformats.org/presentationml/2006/ole">
             <mc:AlternateContent xmlns:mc="http://schemas.openxmlformats.org/markup-compatibility/2006">
               <mc:Choice xmlns:v="urn:schemas-microsoft-com:vml" Requires="v">
-                <p:oleObj spid="_x0000_s2050" name="think-cell Slide" r:id="rId5" imgW="377" imgH="377" progId="TCLayout.ActiveDocument.1">
+                <p:oleObj spid="_x0000_s2057" name="think-cell Slide" r:id="rId5" imgW="377" imgH="377" progId="TCLayout.ActiveDocument.1">
                   <p:embed/>
                 </p:oleObj>
               </mc:Choice>
@@ -48776,7 +48872,7 @@
         <p:spPr>
           <a:xfrm>
             <a:off x="2415823" y="1897530"/>
-            <a:ext cx="8711776" cy="3046988"/>
+            <a:ext cx="8711776" cy="3785652"/>
           </a:xfrm>
           <a:prstGeom prst="rect">
             <a:avLst/>
@@ -48815,6 +48911,21 @@
                 <a:cs typeface="Times New Roman" panose="02020603050405020304" pitchFamily="18" charset="0"/>
               </a:rPr>
               <a:t>Azure ML</a:t>
+            </a:r>
+          </a:p>
+          <a:p>
+            <a:pPr marL="685800" indent="-685800">
+              <a:buFont typeface="Arial" panose="020B0604020202020204" pitchFamily="34" charset="0"/>
+              <a:buChar char="•"/>
+            </a:pPr>
+            <a:r>
+              <a:rPr lang="en-US" sz="4800" dirty="0">
+                <a:solidFill>
+                  <a:srgbClr val="002864"/>
+                </a:solidFill>
+                <a:cs typeface="Times New Roman" panose="02020603050405020304" pitchFamily="18" charset="0"/>
+              </a:rPr>
+              <a:t>HDInsight</a:t>
             </a:r>
           </a:p>
           <a:p>
@@ -48978,7 +49089,7 @@
         <p:spPr>
           <a:xfrm>
             <a:off x="136764" y="1803064"/>
-            <a:ext cx="7514284" cy="5386090"/>
+            <a:ext cx="7514284" cy="4765407"/>
           </a:xfrm>
           <a:prstGeom prst="rect">
             <a:avLst/>
@@ -49228,26 +49339,6 @@
                 <a:latin typeface="Segoe UI Light"/>
               </a:rPr>
               <a:t>Understand how to source and document data locations</a:t>
-            </a:r>
-          </a:p>
-          <a:p>
-            <a:pPr marL="514350" indent="-514350">
-              <a:lnSpc>
-                <a:spcPct val="100000"/>
-              </a:lnSpc>
-              <a:spcBef>
-                <a:spcPts val="1000"/>
-              </a:spcBef>
-              <a:buAutoNum type="arabicPeriod"/>
-            </a:pPr>
-            <a:r>
-              <a:rPr lang="en-US" sz="3200" dirty="0">
-                <a:solidFill>
-                  <a:srgbClr val="00B050"/>
-                </a:solidFill>
-                <a:latin typeface="Segoe UI Light"/>
-              </a:rPr>
-              <a:t>Understand feature selection</a:t>
             </a:r>
           </a:p>
           <a:p>
@@ -49988,7 +50079,7 @@
         <p:spPr>
           <a:xfrm>
             <a:off x="4450580" y="1000624"/>
-            <a:ext cx="7514284" cy="4765407"/>
+            <a:ext cx="7514284" cy="4144724"/>
           </a:xfrm>
           <a:prstGeom prst="rect">
             <a:avLst/>
@@ -50259,27 +50350,6 @@
                 </a:solidFill>
                 <a:latin typeface="Segoe UI Light"/>
               </a:rPr>
-              <a:t>Understand feature selection</a:t>
-            </a:r>
-          </a:p>
-          <a:p>
-            <a:pPr marL="514350" indent="-514350">
-              <a:lnSpc>
-                <a:spcPct val="100000"/>
-              </a:lnSpc>
-              <a:spcBef>
-                <a:spcPts val="1000"/>
-              </a:spcBef>
-              <a:buFont typeface="Arial" pitchFamily="34" charset="0"/>
-              <a:buAutoNum type="arabicPeriod"/>
-            </a:pPr>
-            <a:r>
-              <a:rPr lang="en-US" sz="3200" dirty="0">
-                <a:solidFill>
-                  <a:schemeClr val="bg1"/>
-                </a:solidFill>
-                <a:latin typeface="Segoe UI Light"/>
-              </a:rPr>
               <a:t>Understand Azure Storage Options</a:t>
             </a:r>
           </a:p>
@@ -50522,7 +50592,11 @@
           <p:cNvPr id="3" name="Diagram 2"/>
           <p:cNvGraphicFramePr/>
           <p:nvPr>
-            <p:extLst/>
+            <p:extLst>
+              <p:ext uri="{D42A27DB-BD31-4B8C-83A1-F6EECF244321}">
+                <p14:modId xmlns:p14="http://schemas.microsoft.com/office/powerpoint/2010/main" val="2520446890"/>
+              </p:ext>
+            </p:extLst>
           </p:nvPr>
         </p:nvGraphicFramePr>
         <p:xfrm>
@@ -51085,7 +51159,7 @@
         <p:spPr>
           <a:xfrm>
             <a:off x="5078776" y="1380855"/>
-            <a:ext cx="6172528" cy="4897259"/>
+            <a:ext cx="6172528" cy="5587897"/>
           </a:xfrm>
           <a:prstGeom prst="rect">
             <a:avLst/>
@@ -51353,28 +51427,35 @@
             <a:pPr marL="342834" indent="-342834" defTabSz="932563"/>
             <a:r>
               <a:rPr lang="en-US" sz="4080" dirty="0"/>
-              <a:t>Spread</a:t>
+              <a:t>Amount</a:t>
             </a:r>
           </a:p>
           <a:p>
             <a:pPr marL="342834" indent="-342834" defTabSz="932563"/>
             <a:r>
               <a:rPr lang="en-US" sz="4080" dirty="0"/>
-              <a:t>Consistency</a:t>
+              <a:t>Representative</a:t>
             </a:r>
           </a:p>
           <a:p>
             <a:pPr marL="342834" indent="-342834" defTabSz="932563"/>
             <a:r>
               <a:rPr lang="en-US" sz="4080" dirty="0"/>
-              <a:t>Types and Units</a:t>
+              <a:t>Missing values</a:t>
             </a:r>
           </a:p>
           <a:p>
             <a:pPr marL="342834" indent="-342834" defTabSz="932563"/>
             <a:r>
               <a:rPr lang="en-US" sz="4080" dirty="0"/>
-              <a:t>Representation</a:t>
+              <a:t>Types</a:t>
+            </a:r>
+          </a:p>
+          <a:p>
+            <a:pPr marL="342834" indent="-342834" defTabSz="932563"/>
+            <a:r>
+              <a:rPr lang="en-US" sz="4080" dirty="0"/>
+              <a:t>Ranges</a:t>
             </a:r>
           </a:p>
         </p:txBody>
@@ -51395,7 +51476,7 @@
         </p:blipFill>
         <p:spPr>
           <a:xfrm>
-            <a:off x="-581771" y="926389"/>
+            <a:off x="-581771" y="943642"/>
             <a:ext cx="6153067" cy="6153067"/>
           </a:xfrm>
           <a:prstGeom prst="rect">
@@ -55091,10 +55172,10 @@
     <ds:schemaRef ds:uri="http://schemas.microsoft.com/office/2006/metadata/properties"/>
     <ds:schemaRef ds:uri="http://schemas.microsoft.com/sharepoint/v3"/>
     <ds:schemaRef ds:uri="http://purl.org/dc/terms/"/>
-    <ds:schemaRef ds:uri="9bc6b55d-a734-43bd-8eab-fb065c703cf5"/>
+    <ds:schemaRef ds:uri="http://schemas.openxmlformats.org/package/2006/metadata/core-properties"/>
     <ds:schemaRef ds:uri="http://schemas.microsoft.com/office/2006/documentManagement/types"/>
     <ds:schemaRef ds:uri="http://schemas.microsoft.com/office/infopath/2007/PartnerControls"/>
-    <ds:schemaRef ds:uri="http://schemas.openxmlformats.org/package/2006/metadata/core-properties"/>
+    <ds:schemaRef ds:uri="9bc6b55d-a734-43bd-8eab-fb065c703cf5"/>
     <ds:schemaRef ds:uri="http://www.w3.org/XML/1998/namespace"/>
     <ds:schemaRef ds:uri="http://purl.org/dc/dcmitype/"/>
   </ds:schemaRefs>

</xml_diff>

<commit_message>
Updates to modules 1-3,5,6 NYC delivery - see VSO for change details
</commit_message>
<xml_diff>
--- a/Instructor/CISW - Foundations Section 2.pptx
+++ b/Instructor/CISW - Foundations Section 2.pptx
@@ -2355,6 +2355,44 @@
         </a:p>
       </dgm:t>
     </dgm:pt>
+    <dgm:pt modelId="{459A1013-0A03-42AB-915D-FC793F5268A6}">
+      <dgm:prSet phldrT="[Text]" custT="1"/>
+      <dgm:spPr/>
+      <dgm:t>
+        <a:bodyPr/>
+        <a:lstStyle/>
+        <a:p>
+          <a:r>
+            <a:rPr lang="en-US" sz="2000" dirty="0">
+              <a:latin typeface="+mj-lt"/>
+            </a:rPr>
+            <a:t>Evaluation</a:t>
+          </a:r>
+        </a:p>
+      </dgm:t>
+    </dgm:pt>
+    <dgm:pt modelId="{8AEAA077-4259-4C23-AD7B-490841F0C203}" type="parTrans" cxnId="{5F5B1E8A-7558-4499-8BC9-E5245219D0BB}">
+      <dgm:prSet/>
+      <dgm:spPr/>
+      <dgm:t>
+        <a:bodyPr/>
+        <a:lstStyle/>
+        <a:p>
+          <a:endParaRPr lang="en-US"/>
+        </a:p>
+      </dgm:t>
+    </dgm:pt>
+    <dgm:pt modelId="{114433D9-7FE6-4491-9053-247CC035F022}" type="sibTrans" cxnId="{5F5B1E8A-7558-4499-8BC9-E5245219D0BB}">
+      <dgm:prSet/>
+      <dgm:spPr/>
+      <dgm:t>
+        <a:bodyPr/>
+        <a:lstStyle/>
+        <a:p>
+          <a:endParaRPr lang="en-US"/>
+        </a:p>
+      </dgm:t>
+    </dgm:pt>
     <dgm:pt modelId="{C5ED45AB-5708-4618-8F2A-585D84BC9EAD}" type="pres">
       <dgm:prSet presAssocID="{A6842990-62A4-4545-B120-1F8AF25A0D6E}" presName="Name0" presStyleCnt="0">
         <dgm:presLayoutVars>
@@ -2488,39 +2526,41 @@
     </dgm:pt>
   </dgm:ptLst>
   <dgm:cxnLst>
+    <dgm:cxn modelId="{DDE004FE-29B7-4A52-86FC-2EB3E9848396}" type="presOf" srcId="{31989D70-38F8-40B4-A5B4-5B64244B04DB}" destId="{C971C0CD-D6D6-4BD2-B517-483DD2B85EA0}" srcOrd="0" destOrd="0" presId="urn:microsoft.com/office/officeart/2005/8/layout/vList5"/>
+    <dgm:cxn modelId="{1FC3DAAC-2674-4AC0-A681-6AC6E1E041FE}" type="presOf" srcId="{07E81225-DE19-4D3E-99CD-FC123A33837F}" destId="{DE1FE771-1582-4775-9E8F-B758D933162D}" srcOrd="0" destOrd="0" presId="urn:microsoft.com/office/officeart/2005/8/layout/vList5"/>
+    <dgm:cxn modelId="{60DB5F81-807B-4DAD-8ED9-6DCE2A60111F}" type="presOf" srcId="{8589F281-C004-49C2-9A17-144391E503DE}" destId="{43C6ABD0-F64A-458E-8A26-0D837897DC64}" srcOrd="0" destOrd="0" presId="urn:microsoft.com/office/officeart/2005/8/layout/vList5"/>
+    <dgm:cxn modelId="{220E0694-B595-46BE-BDB9-2B1763BF7F42}" srcId="{0FF8BA2A-500B-413D-8B7A-0FD72A53075A}" destId="{7C9DA717-4609-4F35-9627-FBCE587B2E07}" srcOrd="1" destOrd="0" parTransId="{E5D39B11-6038-4BAB-A377-66C89B23A4FE}" sibTransId="{C70C4ADA-4F3B-4BCA-9873-A32F1BD4BEED}"/>
+    <dgm:cxn modelId="{8122CC33-B4F2-4AA4-9832-D53CD089768C}" type="presOf" srcId="{75DF6D0E-EF2D-4899-8D56-11F561E3DB25}" destId="{C5DBDEB5-64EF-486D-ADE8-9AD2774135B2}" srcOrd="0" destOrd="0" presId="urn:microsoft.com/office/officeart/2005/8/layout/vList5"/>
+    <dgm:cxn modelId="{5B8A5B89-8F81-44AC-99A7-28416883F921}" type="presOf" srcId="{459A1013-0A03-42AB-915D-FC793F5268A6}" destId="{EF322D6C-1CB6-431F-8B42-A64D898D2824}" srcOrd="0" destOrd="2" presId="urn:microsoft.com/office/officeart/2005/8/layout/vList5"/>
+    <dgm:cxn modelId="{657DF6AF-D666-4D2C-A115-75BA748559C6}" type="presOf" srcId="{8A560357-68DD-41D8-841B-C94F1FF7F8C1}" destId="{B35FD520-5FF0-41BD-887C-8B0911FFCB12}" srcOrd="0" destOrd="2" presId="urn:microsoft.com/office/officeart/2005/8/layout/vList5"/>
+    <dgm:cxn modelId="{2178D97F-3CAA-4CEB-BCA2-825BD11AB20F}" type="presOf" srcId="{FFA8810D-171E-4ADC-9CA8-AD57E9D504B9}" destId="{B35FD520-5FF0-41BD-887C-8B0911FFCB12}" srcOrd="0" destOrd="1" presId="urn:microsoft.com/office/officeart/2005/8/layout/vList5"/>
+    <dgm:cxn modelId="{F9E74B76-F3C8-474B-BE2E-672A4119380A}" srcId="{31989D70-38F8-40B4-A5B4-5B64244B04DB}" destId="{07E81225-DE19-4D3E-99CD-FC123A33837F}" srcOrd="0" destOrd="0" parTransId="{642D5DAC-991D-456E-978D-DDF8870668E2}" sibTransId="{71EEF2D0-2FC1-4663-8EEF-F8400FED6EFD}"/>
+    <dgm:cxn modelId="{6D9D5740-A78E-432A-A19B-79A7629DFBD0}" srcId="{F1A8E0FB-6830-44B9-AD5D-2C6541803F4D}" destId="{8A560357-68DD-41D8-841B-C94F1FF7F8C1}" srcOrd="2" destOrd="0" parTransId="{3BC3B257-E716-47FF-9C4E-A1CCC502A26F}" sibTransId="{0F75D6C4-A5C5-4C0B-A3E7-E1F9127F0B24}"/>
+    <dgm:cxn modelId="{DB01149F-013B-4AAC-83B8-EA5A02812FB1}" srcId="{F1A8E0FB-6830-44B9-AD5D-2C6541803F4D}" destId="{6DCAF490-84DF-45AB-95F8-850141BC8BDF}" srcOrd="0" destOrd="0" parTransId="{313354FE-947E-4C91-850E-55158EB5406E}" sibTransId="{263CB43B-A0A5-48BB-9C20-6635267C3C22}"/>
+    <dgm:cxn modelId="{E0CB53AF-1846-4839-A817-1BC95F8C73F9}" srcId="{F1A8E0FB-6830-44B9-AD5D-2C6541803F4D}" destId="{FFA8810D-171E-4ADC-9CA8-AD57E9D504B9}" srcOrd="1" destOrd="0" parTransId="{5D65951A-CE03-4794-9B2D-0A910A6F7FFB}" sibTransId="{39C8D19E-6ADE-404A-843B-5F7020E72704}"/>
     <dgm:cxn modelId="{0E99CA05-F61F-4393-A01F-8CCEDBA18F50}" srcId="{75DF6D0E-EF2D-4899-8D56-11F561E3DB25}" destId="{22DA92B9-9C40-4A25-8285-966799791BE7}" srcOrd="2" destOrd="0" parTransId="{31A0D76F-F3CA-4A56-BA36-A4E6E0932F46}" sibTransId="{C2D43770-B53D-4E3F-BFD7-DA47BF161F8F}"/>
+    <dgm:cxn modelId="{F6DB5C63-69FA-4FC9-BB9C-7D6AEF8B14EB}" type="presOf" srcId="{EFB0480E-A451-4750-9076-B8DA17ACD683}" destId="{EF322D6C-1CB6-431F-8B42-A64D898D2824}" srcOrd="0" destOrd="1" presId="urn:microsoft.com/office/officeart/2005/8/layout/vList5"/>
+    <dgm:cxn modelId="{BEEC91A6-BF3F-4E21-859A-6D47ACAB8869}" srcId="{A6842990-62A4-4545-B120-1F8AF25A0D6E}" destId="{D66E06A0-8A7E-4EC6-8113-DDE9A8B91FA6}" srcOrd="2" destOrd="0" parTransId="{C867E6D7-68AF-43C6-9E80-BCCDD787550D}" sibTransId="{4B0A02DB-F299-4AF6-A72B-B326FF7FE0BF}"/>
+    <dgm:cxn modelId="{9197056C-C44F-4A04-AEB6-8E23C28CFBCA}" type="presOf" srcId="{D66E06A0-8A7E-4EC6-8113-DDE9A8B91FA6}" destId="{D8CBC06D-2193-488F-8EDE-5FAA991E0B6B}" srcOrd="0" destOrd="0" presId="urn:microsoft.com/office/officeart/2005/8/layout/vList5"/>
+    <dgm:cxn modelId="{9324FDFF-96EF-4D6F-B059-8A767EA02701}" type="presOf" srcId="{051E23BA-27D6-402B-8FD0-643279078F48}" destId="{E36319A3-4DDD-4596-A48B-3AFC2FB82E08}" srcOrd="0" destOrd="1" presId="urn:microsoft.com/office/officeart/2005/8/layout/vList5"/>
+    <dgm:cxn modelId="{61EC2C2C-336E-4152-BF38-E133255426BA}" srcId="{D66E06A0-8A7E-4EC6-8113-DDE9A8B91FA6}" destId="{E08D914F-4215-41A4-8173-F3CBF316F76B}" srcOrd="0" destOrd="0" parTransId="{6E6AFD42-BD05-4248-B472-1EFABC017324}" sibTransId="{1759AAC5-ADE9-4C55-8CBC-F1BA87C7A449}"/>
+    <dgm:cxn modelId="{B844C6F1-2818-4F3A-97BB-A513A7A6487D}" srcId="{0FF8BA2A-500B-413D-8B7A-0FD72A53075A}" destId="{8589F281-C004-49C2-9A17-144391E503DE}" srcOrd="0" destOrd="0" parTransId="{68ACA663-A4B5-4322-A79B-E6FDA765E412}" sibTransId="{C3FF912E-6EAA-40C0-8E91-AAAED8175040}"/>
+    <dgm:cxn modelId="{A7498686-3363-4727-9125-3753C7FB4287}" type="presOf" srcId="{A6842990-62A4-4545-B120-1F8AF25A0D6E}" destId="{C5ED45AB-5708-4618-8F2A-585D84BC9EAD}" srcOrd="0" destOrd="0" presId="urn:microsoft.com/office/officeart/2005/8/layout/vList5"/>
+    <dgm:cxn modelId="{5F5B1E8A-7558-4499-8BC9-E5245219D0BB}" srcId="{D66E06A0-8A7E-4EC6-8113-DDE9A8B91FA6}" destId="{459A1013-0A03-42AB-915D-FC793F5268A6}" srcOrd="2" destOrd="0" parTransId="{8AEAA077-4259-4C23-AD7B-490841F0C203}" sibTransId="{114433D9-7FE6-4491-9053-247CC035F022}"/>
+    <dgm:cxn modelId="{F4DF8B2E-967B-4C23-9FF5-BB008183100C}" type="presOf" srcId="{F1A8E0FB-6830-44B9-AD5D-2C6541803F4D}" destId="{3E606814-09D9-4B4C-8F40-66F312978EEB}" srcOrd="0" destOrd="0" presId="urn:microsoft.com/office/officeart/2005/8/layout/vList5"/>
+    <dgm:cxn modelId="{ACACF1CD-A9C0-4633-8495-72FF45057E3A}" type="presOf" srcId="{7C9DA717-4609-4F35-9627-FBCE587B2E07}" destId="{43C6ABD0-F64A-458E-8A26-0D837897DC64}" srcOrd="0" destOrd="1" presId="urn:microsoft.com/office/officeart/2005/8/layout/vList5"/>
+    <dgm:cxn modelId="{991DC740-DAA8-4D0F-9BAB-A0D216E7CC9C}" srcId="{A6842990-62A4-4545-B120-1F8AF25A0D6E}" destId="{31989D70-38F8-40B4-A5B4-5B64244B04DB}" srcOrd="3" destOrd="0" parTransId="{E572721F-5C44-451C-B622-59B69949FB6F}" sibTransId="{FF3730C5-5E1C-4ACF-986C-1F8BDC2A87DC}"/>
+    <dgm:cxn modelId="{A346880C-19BB-492E-86E8-A5888A7956E2}" srcId="{A6842990-62A4-4545-B120-1F8AF25A0D6E}" destId="{0FF8BA2A-500B-413D-8B7A-0FD72A53075A}" srcOrd="0" destOrd="0" parTransId="{A445CB5E-895F-4150-B184-2C8283752FC5}" sibTransId="{F4903262-3BB8-4A76-A3AA-54C0993BC220}"/>
+    <dgm:cxn modelId="{FC9795E3-DBDF-499A-B2B6-4B8E6CA578BE}" type="presOf" srcId="{E08D914F-4215-41A4-8173-F3CBF316F76B}" destId="{EF322D6C-1CB6-431F-8B42-A64D898D2824}" srcOrd="0" destOrd="0" presId="urn:microsoft.com/office/officeart/2005/8/layout/vList5"/>
     <dgm:cxn modelId="{6D864F09-96B6-4444-95BB-D36241D055AD}" srcId="{A6842990-62A4-4545-B120-1F8AF25A0D6E}" destId="{75DF6D0E-EF2D-4899-8D56-11F561E3DB25}" srcOrd="4" destOrd="0" parTransId="{510C85D3-5932-4392-B61F-F44832C002FA}" sibTransId="{EEE1824F-AA0C-4316-B13D-ED5B6C4A0BFF}"/>
-    <dgm:cxn modelId="{A346880C-19BB-492E-86E8-A5888A7956E2}" srcId="{A6842990-62A4-4545-B120-1F8AF25A0D6E}" destId="{0FF8BA2A-500B-413D-8B7A-0FD72A53075A}" srcOrd="0" destOrd="0" parTransId="{A445CB5E-895F-4150-B184-2C8283752FC5}" sibTransId="{F4903262-3BB8-4A76-A3AA-54C0993BC220}"/>
-    <dgm:cxn modelId="{61EC2C2C-336E-4152-BF38-E133255426BA}" srcId="{D66E06A0-8A7E-4EC6-8113-DDE9A8B91FA6}" destId="{E08D914F-4215-41A4-8173-F3CBF316F76B}" srcOrd="0" destOrd="0" parTransId="{6E6AFD42-BD05-4248-B472-1EFABC017324}" sibTransId="{1759AAC5-ADE9-4C55-8CBC-F1BA87C7A449}"/>
-    <dgm:cxn modelId="{F4DF8B2E-967B-4C23-9FF5-BB008183100C}" type="presOf" srcId="{F1A8E0FB-6830-44B9-AD5D-2C6541803F4D}" destId="{3E606814-09D9-4B4C-8F40-66F312978EEB}" srcOrd="0" destOrd="0" presId="urn:microsoft.com/office/officeart/2005/8/layout/vList5"/>
-    <dgm:cxn modelId="{8122CC33-B4F2-4AA4-9832-D53CD089768C}" type="presOf" srcId="{75DF6D0E-EF2D-4899-8D56-11F561E3DB25}" destId="{C5DBDEB5-64EF-486D-ADE8-9AD2774135B2}" srcOrd="0" destOrd="0" presId="urn:microsoft.com/office/officeart/2005/8/layout/vList5"/>
     <dgm:cxn modelId="{D9C32539-B0FF-4269-910E-8E2F3FB2481A}" type="presOf" srcId="{6DCAF490-84DF-45AB-95F8-850141BC8BDF}" destId="{B35FD520-5FF0-41BD-887C-8B0911FFCB12}" srcOrd="0" destOrd="0" presId="urn:microsoft.com/office/officeart/2005/8/layout/vList5"/>
-    <dgm:cxn modelId="{6D9D5740-A78E-432A-A19B-79A7629DFBD0}" srcId="{F1A8E0FB-6830-44B9-AD5D-2C6541803F4D}" destId="{8A560357-68DD-41D8-841B-C94F1FF7F8C1}" srcOrd="2" destOrd="0" parTransId="{3BC3B257-E716-47FF-9C4E-A1CCC502A26F}" sibTransId="{0F75D6C4-A5C5-4C0B-A3E7-E1F9127F0B24}"/>
-    <dgm:cxn modelId="{991DC740-DAA8-4D0F-9BAB-A0D216E7CC9C}" srcId="{A6842990-62A4-4545-B120-1F8AF25A0D6E}" destId="{31989D70-38F8-40B4-A5B4-5B64244B04DB}" srcOrd="3" destOrd="0" parTransId="{E572721F-5C44-451C-B622-59B69949FB6F}" sibTransId="{FF3730C5-5E1C-4ACF-986C-1F8BDC2A87DC}"/>
+    <dgm:cxn modelId="{66A8234E-E4C2-45FA-965B-ECB6FD1A9659}" type="presOf" srcId="{0EBDD81E-61F5-4638-8D23-E64C5784A7CF}" destId="{E36319A3-4DDD-4596-A48B-3AFC2FB82E08}" srcOrd="0" destOrd="0" presId="urn:microsoft.com/office/officeart/2005/8/layout/vList5"/>
+    <dgm:cxn modelId="{9D250ACB-3782-4169-9513-D5939A72E14C}" srcId="{75DF6D0E-EF2D-4899-8D56-11F561E3DB25}" destId="{051E23BA-27D6-402B-8FD0-643279078F48}" srcOrd="1" destOrd="0" parTransId="{DA361144-F3E9-4156-9CC2-FE98E458196C}" sibTransId="{AE55AD9A-A016-48D5-8B34-AF4339F64545}"/>
     <dgm:cxn modelId="{0652195D-79AA-41CB-A507-64DF25821FDC}" srcId="{75DF6D0E-EF2D-4899-8D56-11F561E3DB25}" destId="{0EBDD81E-61F5-4638-8D23-E64C5784A7CF}" srcOrd="0" destOrd="0" parTransId="{5BB68B6B-2470-4B4F-B825-03319C46AB79}" sibTransId="{91158606-88ED-478A-99A3-FF66895B49FF}"/>
-    <dgm:cxn modelId="{F6DB5C63-69FA-4FC9-BB9C-7D6AEF8B14EB}" type="presOf" srcId="{EFB0480E-A451-4750-9076-B8DA17ACD683}" destId="{EF322D6C-1CB6-431F-8B42-A64D898D2824}" srcOrd="0" destOrd="1" presId="urn:microsoft.com/office/officeart/2005/8/layout/vList5"/>
-    <dgm:cxn modelId="{9197056C-C44F-4A04-AEB6-8E23C28CFBCA}" type="presOf" srcId="{D66E06A0-8A7E-4EC6-8113-DDE9A8B91FA6}" destId="{D8CBC06D-2193-488F-8EDE-5FAA991E0B6B}" srcOrd="0" destOrd="0" presId="urn:microsoft.com/office/officeart/2005/8/layout/vList5"/>
-    <dgm:cxn modelId="{66A8234E-E4C2-45FA-965B-ECB6FD1A9659}" type="presOf" srcId="{0EBDD81E-61F5-4638-8D23-E64C5784A7CF}" destId="{E36319A3-4DDD-4596-A48B-3AFC2FB82E08}" srcOrd="0" destOrd="0" presId="urn:microsoft.com/office/officeart/2005/8/layout/vList5"/>
+    <dgm:cxn modelId="{DA864F5A-43C0-4EAB-ACD8-C653DCDBC285}" srcId="{A6842990-62A4-4545-B120-1F8AF25A0D6E}" destId="{F1A8E0FB-6830-44B9-AD5D-2C6541803F4D}" srcOrd="1" destOrd="0" parTransId="{BA9882FF-0D62-440B-AE35-07B5440B7352}" sibTransId="{BE3BCC92-A824-45B0-AD74-589AA75A91ED}"/>
+    <dgm:cxn modelId="{78B26055-4003-4B61-B1A2-86AC6919F907}" type="presOf" srcId="{22DA92B9-9C40-4A25-8285-966799791BE7}" destId="{E36319A3-4DDD-4596-A48B-3AFC2FB82E08}" srcOrd="0" destOrd="2" presId="urn:microsoft.com/office/officeart/2005/8/layout/vList5"/>
+    <dgm:cxn modelId="{A345E6FB-E582-491A-BAAE-F2A1141E8D26}" type="presOf" srcId="{0FF8BA2A-500B-413D-8B7A-0FD72A53075A}" destId="{FCE31E78-3DAC-4692-A464-D0C835B3F5C0}" srcOrd="0" destOrd="0" presId="urn:microsoft.com/office/officeart/2005/8/layout/vList5"/>
     <dgm:cxn modelId="{F0686254-8BC6-438F-8EFC-387D3C1B4582}" srcId="{D66E06A0-8A7E-4EC6-8113-DDE9A8B91FA6}" destId="{EFB0480E-A451-4750-9076-B8DA17ACD683}" srcOrd="1" destOrd="0" parTransId="{02255FE4-1BB8-44C8-8FC3-2DB4276D8435}" sibTransId="{7ECF0E78-DA31-4B08-B8BA-D36DB4135973}"/>
-    <dgm:cxn modelId="{78B26055-4003-4B61-B1A2-86AC6919F907}" type="presOf" srcId="{22DA92B9-9C40-4A25-8285-966799791BE7}" destId="{E36319A3-4DDD-4596-A48B-3AFC2FB82E08}" srcOrd="0" destOrd="2" presId="urn:microsoft.com/office/officeart/2005/8/layout/vList5"/>
-    <dgm:cxn modelId="{F9E74B76-F3C8-474B-BE2E-672A4119380A}" srcId="{31989D70-38F8-40B4-A5B4-5B64244B04DB}" destId="{07E81225-DE19-4D3E-99CD-FC123A33837F}" srcOrd="0" destOrd="0" parTransId="{642D5DAC-991D-456E-978D-DDF8870668E2}" sibTransId="{71EEF2D0-2FC1-4663-8EEF-F8400FED6EFD}"/>
-    <dgm:cxn modelId="{DA864F5A-43C0-4EAB-ACD8-C653DCDBC285}" srcId="{A6842990-62A4-4545-B120-1F8AF25A0D6E}" destId="{F1A8E0FB-6830-44B9-AD5D-2C6541803F4D}" srcOrd="1" destOrd="0" parTransId="{BA9882FF-0D62-440B-AE35-07B5440B7352}" sibTransId="{BE3BCC92-A824-45B0-AD74-589AA75A91ED}"/>
-    <dgm:cxn modelId="{2178D97F-3CAA-4CEB-BCA2-825BD11AB20F}" type="presOf" srcId="{FFA8810D-171E-4ADC-9CA8-AD57E9D504B9}" destId="{B35FD520-5FF0-41BD-887C-8B0911FFCB12}" srcOrd="0" destOrd="1" presId="urn:microsoft.com/office/officeart/2005/8/layout/vList5"/>
-    <dgm:cxn modelId="{60DB5F81-807B-4DAD-8ED9-6DCE2A60111F}" type="presOf" srcId="{8589F281-C004-49C2-9A17-144391E503DE}" destId="{43C6ABD0-F64A-458E-8A26-0D837897DC64}" srcOrd="0" destOrd="0" presId="urn:microsoft.com/office/officeart/2005/8/layout/vList5"/>
-    <dgm:cxn modelId="{A7498686-3363-4727-9125-3753C7FB4287}" type="presOf" srcId="{A6842990-62A4-4545-B120-1F8AF25A0D6E}" destId="{C5ED45AB-5708-4618-8F2A-585D84BC9EAD}" srcOrd="0" destOrd="0" presId="urn:microsoft.com/office/officeart/2005/8/layout/vList5"/>
-    <dgm:cxn modelId="{220E0694-B595-46BE-BDB9-2B1763BF7F42}" srcId="{0FF8BA2A-500B-413D-8B7A-0FD72A53075A}" destId="{7C9DA717-4609-4F35-9627-FBCE587B2E07}" srcOrd="1" destOrd="0" parTransId="{E5D39B11-6038-4BAB-A377-66C89B23A4FE}" sibTransId="{C70C4ADA-4F3B-4BCA-9873-A32F1BD4BEED}"/>
-    <dgm:cxn modelId="{DB01149F-013B-4AAC-83B8-EA5A02812FB1}" srcId="{F1A8E0FB-6830-44B9-AD5D-2C6541803F4D}" destId="{6DCAF490-84DF-45AB-95F8-850141BC8BDF}" srcOrd="0" destOrd="0" parTransId="{313354FE-947E-4C91-850E-55158EB5406E}" sibTransId="{263CB43B-A0A5-48BB-9C20-6635267C3C22}"/>
-    <dgm:cxn modelId="{BEEC91A6-BF3F-4E21-859A-6D47ACAB8869}" srcId="{A6842990-62A4-4545-B120-1F8AF25A0D6E}" destId="{D66E06A0-8A7E-4EC6-8113-DDE9A8B91FA6}" srcOrd="2" destOrd="0" parTransId="{C867E6D7-68AF-43C6-9E80-BCCDD787550D}" sibTransId="{4B0A02DB-F299-4AF6-A72B-B326FF7FE0BF}"/>
-    <dgm:cxn modelId="{1FC3DAAC-2674-4AC0-A681-6AC6E1E041FE}" type="presOf" srcId="{07E81225-DE19-4D3E-99CD-FC123A33837F}" destId="{DE1FE771-1582-4775-9E8F-B758D933162D}" srcOrd="0" destOrd="0" presId="urn:microsoft.com/office/officeart/2005/8/layout/vList5"/>
-    <dgm:cxn modelId="{E0CB53AF-1846-4839-A817-1BC95F8C73F9}" srcId="{F1A8E0FB-6830-44B9-AD5D-2C6541803F4D}" destId="{FFA8810D-171E-4ADC-9CA8-AD57E9D504B9}" srcOrd="1" destOrd="0" parTransId="{5D65951A-CE03-4794-9B2D-0A910A6F7FFB}" sibTransId="{39C8D19E-6ADE-404A-843B-5F7020E72704}"/>
-    <dgm:cxn modelId="{657DF6AF-D666-4D2C-A115-75BA748559C6}" type="presOf" srcId="{8A560357-68DD-41D8-841B-C94F1FF7F8C1}" destId="{B35FD520-5FF0-41BD-887C-8B0911FFCB12}" srcOrd="0" destOrd="2" presId="urn:microsoft.com/office/officeart/2005/8/layout/vList5"/>
-    <dgm:cxn modelId="{9D250ACB-3782-4169-9513-D5939A72E14C}" srcId="{75DF6D0E-EF2D-4899-8D56-11F561E3DB25}" destId="{051E23BA-27D6-402B-8FD0-643279078F48}" srcOrd="1" destOrd="0" parTransId="{DA361144-F3E9-4156-9CC2-FE98E458196C}" sibTransId="{AE55AD9A-A016-48D5-8B34-AF4339F64545}"/>
-    <dgm:cxn modelId="{ACACF1CD-A9C0-4633-8495-72FF45057E3A}" type="presOf" srcId="{7C9DA717-4609-4F35-9627-FBCE587B2E07}" destId="{43C6ABD0-F64A-458E-8A26-0D837897DC64}" srcOrd="0" destOrd="1" presId="urn:microsoft.com/office/officeart/2005/8/layout/vList5"/>
-    <dgm:cxn modelId="{FC9795E3-DBDF-499A-B2B6-4B8E6CA578BE}" type="presOf" srcId="{E08D914F-4215-41A4-8173-F3CBF316F76B}" destId="{EF322D6C-1CB6-431F-8B42-A64D898D2824}" srcOrd="0" destOrd="0" presId="urn:microsoft.com/office/officeart/2005/8/layout/vList5"/>
-    <dgm:cxn modelId="{B844C6F1-2818-4F3A-97BB-A513A7A6487D}" srcId="{0FF8BA2A-500B-413D-8B7A-0FD72A53075A}" destId="{8589F281-C004-49C2-9A17-144391E503DE}" srcOrd="0" destOrd="0" parTransId="{68ACA663-A4B5-4322-A79B-E6FDA765E412}" sibTransId="{C3FF912E-6EAA-40C0-8E91-AAAED8175040}"/>
-    <dgm:cxn modelId="{A345E6FB-E582-491A-BAAE-F2A1141E8D26}" type="presOf" srcId="{0FF8BA2A-500B-413D-8B7A-0FD72A53075A}" destId="{FCE31E78-3DAC-4692-A464-D0C835B3F5C0}" srcOrd="0" destOrd="0" presId="urn:microsoft.com/office/officeart/2005/8/layout/vList5"/>
-    <dgm:cxn modelId="{DDE004FE-29B7-4A52-86FC-2EB3E9848396}" type="presOf" srcId="{31989D70-38F8-40B4-A5B4-5B64244B04DB}" destId="{C971C0CD-D6D6-4BD2-B517-483DD2B85EA0}" srcOrd="0" destOrd="0" presId="urn:microsoft.com/office/officeart/2005/8/layout/vList5"/>
-    <dgm:cxn modelId="{9324FDFF-96EF-4D6F-B059-8A767EA02701}" type="presOf" srcId="{051E23BA-27D6-402B-8FD0-643279078F48}" destId="{E36319A3-4DDD-4596-A48B-3AFC2FB82E08}" srcOrd="0" destOrd="1" presId="urn:microsoft.com/office/officeart/2005/8/layout/vList5"/>
     <dgm:cxn modelId="{2F1976CB-BC7D-4DA6-86B6-A03B32E37FD5}" type="presParOf" srcId="{C5ED45AB-5708-4618-8F2A-585D84BC9EAD}" destId="{210816C1-7BD4-4E1F-9BAF-45430065939E}" srcOrd="0" destOrd="0" presId="urn:microsoft.com/office/officeart/2005/8/layout/vList5"/>
     <dgm:cxn modelId="{E698788D-62E0-4A5C-AADF-1FCEDABB06F8}" type="presParOf" srcId="{210816C1-7BD4-4E1F-9BAF-45430065939E}" destId="{FCE31E78-3DAC-4692-A464-D0C835B3F5C0}" srcOrd="0" destOrd="0" presId="urn:microsoft.com/office/officeart/2005/8/layout/vList5"/>
     <dgm:cxn modelId="{5008CCE3-5624-4055-8ECB-E1C45F2FC429}" type="presParOf" srcId="{210816C1-7BD4-4E1F-9BAF-45430065939E}" destId="{43C6ABD0-F64A-458E-8A26-0D837897DC64}" srcOrd="1" destOrd="0" presId="urn:microsoft.com/office/officeart/2005/8/layout/vList5"/>
@@ -3375,40 +3415,40 @@
     </dgm:pt>
   </dgm:ptLst>
   <dgm:cxnLst>
-    <dgm:cxn modelId="{824BE007-D8A8-4BC5-A897-8BE1CC7D6DDF}" type="presOf" srcId="{C693AF90-2E67-4389-9BB6-C5D2CAEEC1FF}" destId="{DD756981-072A-4F78-ABC7-E2A848633815}" srcOrd="1" destOrd="0" presId="urn:microsoft.com/office/officeart/2005/8/layout/vList4"/>
-    <dgm:cxn modelId="{128B230A-B289-4CB6-A6AF-E0A33A02F871}" type="presOf" srcId="{64841DF3-12D3-4C8A-A2EA-2845EC9F38D7}" destId="{C195AAFC-E8BF-40C9-B2F5-85621CF3B988}" srcOrd="1" destOrd="0" presId="urn:microsoft.com/office/officeart/2005/8/layout/vList4"/>
+    <dgm:cxn modelId="{7014A16F-3386-4271-823A-1E3479C1A3C3}" type="presOf" srcId="{F29A499B-128E-4ED9-A5CE-D3EC6833A092}" destId="{21FD6BEC-2BE4-4D3B-9A53-4987D8EC21AC}" srcOrd="0" destOrd="0" presId="urn:microsoft.com/office/officeart/2005/8/layout/vList4"/>
+    <dgm:cxn modelId="{6810593D-FC64-4330-BAC8-B050DD661FD7}" type="presOf" srcId="{64841DF3-12D3-4C8A-A2EA-2845EC9F38D7}" destId="{A07D94F9-EF30-4E20-8074-E413B239BE21}" srcOrd="0" destOrd="0" presId="urn:microsoft.com/office/officeart/2005/8/layout/vList4"/>
+    <dgm:cxn modelId="{25B30777-672F-453D-A925-DF4A3A8C0EF6}" type="presOf" srcId="{EA167186-6F53-4DC7-A045-E6417D37BF33}" destId="{5B74900C-2DC2-4F9C-83EA-B674B8C455C3}" srcOrd="0" destOrd="0" presId="urn:microsoft.com/office/officeart/2005/8/layout/vList4"/>
+    <dgm:cxn modelId="{29C867A9-706B-4082-99B1-529CF2AA153D}" type="presOf" srcId="{011E79D2-CE12-4ACC-B4D0-D9E003466911}" destId="{FF945313-E4F2-443C-9640-F8236C883CA0}" srcOrd="1" destOrd="0" presId="urn:microsoft.com/office/officeart/2005/8/layout/vList4"/>
+    <dgm:cxn modelId="{A7E17DD4-E0EF-4403-AB26-19B7F75407DC}" type="presOf" srcId="{F29A499B-128E-4ED9-A5CE-D3EC6833A092}" destId="{98518E50-33B5-489D-8AF9-BC11CE515B19}" srcOrd="1" destOrd="0" presId="urn:microsoft.com/office/officeart/2005/8/layout/vList4"/>
+    <dgm:cxn modelId="{7E99E56C-D01E-44CA-A2A6-B16A3CB3FA6E}" type="presOf" srcId="{CE92E143-7827-4B23-958C-F5E2952926EC}" destId="{24F30434-915D-401A-842A-C3A44E75A979}" srcOrd="0" destOrd="0" presId="urn:microsoft.com/office/officeart/2005/8/layout/vList4"/>
+    <dgm:cxn modelId="{F7E6D72A-5B0B-4536-9DE8-41E4810247B9}" srcId="{8DA69A69-DF68-414D-8EA4-5B891DFFA5AF}" destId="{011E79D2-CE12-4ACC-B4D0-D9E003466911}" srcOrd="5" destOrd="0" parTransId="{29814D48-68C9-4F1B-A742-4632C8E2EA9C}" sibTransId="{46FBF3BF-5D0C-4A35-BF9D-1D6E2F785FEA}"/>
+    <dgm:cxn modelId="{DB6381F9-22D0-4EC2-89ED-F9723FBC122B}" srcId="{8DA69A69-DF68-414D-8EA4-5B891DFFA5AF}" destId="{87EED9D7-F903-415E-8AD5-FBB20E57F17C}" srcOrd="10" destOrd="0" parTransId="{9CF7ABFF-4CAE-47CB-923D-1BC6D6E97E96}" sibTransId="{845A9F58-8459-4120-83F7-C236F902D2A4}"/>
+    <dgm:cxn modelId="{48C0D9DC-8DEF-4A18-A0E2-0A591D1D23D4}" srcId="{8DA69A69-DF68-414D-8EA4-5B891DFFA5AF}" destId="{64841DF3-12D3-4C8A-A2EA-2845EC9F38D7}" srcOrd="8" destOrd="0" parTransId="{A9E857A5-108E-46DC-B1FD-F3877D7A6824}" sibTransId="{063C695B-C458-492E-9DD8-8C80EDD037E4}"/>
+    <dgm:cxn modelId="{FADBC256-B53A-4253-82DD-D9B3730AA1EC}" type="presOf" srcId="{01BDD74D-C028-4813-9A40-60C9E2F57DB0}" destId="{28517874-F162-4DF2-9EB3-F83C7A652985}" srcOrd="1" destOrd="0" presId="urn:microsoft.com/office/officeart/2005/8/layout/vList4"/>
+    <dgm:cxn modelId="{837E456E-152E-40BC-BEB1-7C6227FC233C}" type="presOf" srcId="{01BDD74D-C028-4813-9A40-60C9E2F57DB0}" destId="{38C1AABC-2A80-4D18-AB70-CD76795B5F08}" srcOrd="0" destOrd="0" presId="urn:microsoft.com/office/officeart/2005/8/layout/vList4"/>
+    <dgm:cxn modelId="{E9CD9087-4D76-4DCC-976E-CEF58E4BDA7B}" srcId="{8DA69A69-DF68-414D-8EA4-5B891DFFA5AF}" destId="{01BDD74D-C028-4813-9A40-60C9E2F57DB0}" srcOrd="0" destOrd="0" parTransId="{B1B801B5-C3BE-4F62-9805-943F9ECCC34B}" sibTransId="{F35B3DDF-F275-4912-BB0B-8814AF11EBD0}"/>
     <dgm:cxn modelId="{DCC80B1A-4E1A-41D5-958B-E5CD639B1B0D}" type="presOf" srcId="{C693AF90-2E67-4389-9BB6-C5D2CAEEC1FF}" destId="{0663B67C-F1DA-4AE8-B977-A72746B0B55A}" srcOrd="0" destOrd="0" presId="urn:microsoft.com/office/officeart/2005/8/layout/vList4"/>
-    <dgm:cxn modelId="{705C021B-4DD7-4E5D-89C9-EDEBD5F17379}" type="presOf" srcId="{CE92E143-7827-4B23-958C-F5E2952926EC}" destId="{BE359720-3DA6-45D3-B11C-BC16643AE4C6}" srcOrd="1" destOrd="0" presId="urn:microsoft.com/office/officeart/2005/8/layout/vList4"/>
-    <dgm:cxn modelId="{F7E6D72A-5B0B-4536-9DE8-41E4810247B9}" srcId="{8DA69A69-DF68-414D-8EA4-5B891DFFA5AF}" destId="{011E79D2-CE12-4ACC-B4D0-D9E003466911}" srcOrd="5" destOrd="0" parTransId="{29814D48-68C9-4F1B-A742-4632C8E2EA9C}" sibTransId="{46FBF3BF-5D0C-4A35-BF9D-1D6E2F785FEA}"/>
+    <dgm:cxn modelId="{3E7B37FE-1F03-4B51-8A7C-5C8D70514817}" type="presOf" srcId="{A7635277-B6AF-417B-AB49-E517FD333C49}" destId="{AF33F1AF-16D3-496F-A982-1F3CBCF4FF8E}" srcOrd="1" destOrd="0" presId="urn:microsoft.com/office/officeart/2005/8/layout/vList4"/>
+    <dgm:cxn modelId="{262F509B-DD73-42F9-9BA8-435A6AFF57F4}" type="presOf" srcId="{AB393BA1-5855-49E3-9B86-59C4B29CEA69}" destId="{9D8C2DA9-47A7-491C-9512-DC63D526E7DA}" srcOrd="1" destOrd="0" presId="urn:microsoft.com/office/officeart/2005/8/layout/vList4"/>
+    <dgm:cxn modelId="{462546E9-5FC3-417D-9427-DDC067EFBA53}" type="presOf" srcId="{8DA69A69-DF68-414D-8EA4-5B891DFFA5AF}" destId="{3245D8A3-8E5E-4370-9560-7D50F08D1AAC}" srcOrd="0" destOrd="0" presId="urn:microsoft.com/office/officeart/2005/8/layout/vList4"/>
+    <dgm:cxn modelId="{8A6687E5-21B2-435D-B10C-332268480112}" srcId="{8DA69A69-DF68-414D-8EA4-5B891DFFA5AF}" destId="{EA167186-6F53-4DC7-A045-E6417D37BF33}" srcOrd="3" destOrd="0" parTransId="{AA45AC8D-893E-49DB-8316-613BBB5646B5}" sibTransId="{9FE0364B-209B-4506-9049-4401EA19AFBC}"/>
+    <dgm:cxn modelId="{8D5B359C-D9E7-4132-8320-19453F90DDBD}" type="presOf" srcId="{A7635277-B6AF-417B-AB49-E517FD333C49}" destId="{5409D7A6-CC75-4C85-8991-EB5D7E28A32C}" srcOrd="0" destOrd="0" presId="urn:microsoft.com/office/officeart/2005/8/layout/vList4"/>
+    <dgm:cxn modelId="{77186B5F-C2E3-45CC-B1DA-3307947B8E66}" type="presOf" srcId="{011E79D2-CE12-4ACC-B4D0-D9E003466911}" destId="{0451AC9A-80EA-4040-A601-D0B64C634769}" srcOrd="0" destOrd="0" presId="urn:microsoft.com/office/officeart/2005/8/layout/vList4"/>
+    <dgm:cxn modelId="{201FA9D4-3A6B-489F-B035-67218D0EF8D5}" srcId="{8DA69A69-DF68-414D-8EA4-5B891DFFA5AF}" destId="{F29A499B-128E-4ED9-A5CE-D3EC6833A092}" srcOrd="9" destOrd="0" parTransId="{CDD56826-666D-4326-B961-511482B1AE98}" sibTransId="{34E1B6F7-AFA1-45F6-B66D-CE24B6F4F3E6}"/>
     <dgm:cxn modelId="{6C569132-71B0-4D77-BA25-C5457021688A}" srcId="{8DA69A69-DF68-414D-8EA4-5B891DFFA5AF}" destId="{B1A5E10D-28EF-4A53-BB42-ADFCEDD33914}" srcOrd="1" destOrd="0" parTransId="{4330C9E9-E525-4CE3-8D83-79DC3A7B548F}" sibTransId="{EE6CE372-F5B4-4C65-BB47-2D0CBB1D465F}"/>
-    <dgm:cxn modelId="{6810593D-FC64-4330-BAC8-B050DD661FD7}" type="presOf" srcId="{64841DF3-12D3-4C8A-A2EA-2845EC9F38D7}" destId="{A07D94F9-EF30-4E20-8074-E413B239BE21}" srcOrd="0" destOrd="0" presId="urn:microsoft.com/office/officeart/2005/8/layout/vList4"/>
-    <dgm:cxn modelId="{77186B5F-C2E3-45CC-B1DA-3307947B8E66}" type="presOf" srcId="{011E79D2-CE12-4ACC-B4D0-D9E003466911}" destId="{0451AC9A-80EA-4040-A601-D0B64C634769}" srcOrd="0" destOrd="0" presId="urn:microsoft.com/office/officeart/2005/8/layout/vList4"/>
-    <dgm:cxn modelId="{E8D64E65-62F1-48F0-A7F4-ECB5F990C6DE}" type="presOf" srcId="{EA167186-6F53-4DC7-A045-E6417D37BF33}" destId="{D2600429-E556-46F6-80E8-880C4820F655}" srcOrd="1" destOrd="0" presId="urn:microsoft.com/office/officeart/2005/8/layout/vList4"/>
-    <dgm:cxn modelId="{7E99E56C-D01E-44CA-A2A6-B16A3CB3FA6E}" type="presOf" srcId="{CE92E143-7827-4B23-958C-F5E2952926EC}" destId="{24F30434-915D-401A-842A-C3A44E75A979}" srcOrd="0" destOrd="0" presId="urn:microsoft.com/office/officeart/2005/8/layout/vList4"/>
-    <dgm:cxn modelId="{837E456E-152E-40BC-BEB1-7C6227FC233C}" type="presOf" srcId="{01BDD74D-C028-4813-9A40-60C9E2F57DB0}" destId="{38C1AABC-2A80-4D18-AB70-CD76795B5F08}" srcOrd="0" destOrd="0" presId="urn:microsoft.com/office/officeart/2005/8/layout/vList4"/>
-    <dgm:cxn modelId="{7014A16F-3386-4271-823A-1E3479C1A3C3}" type="presOf" srcId="{F29A499B-128E-4ED9-A5CE-D3EC6833A092}" destId="{21FD6BEC-2BE4-4D3B-9A53-4987D8EC21AC}" srcOrd="0" destOrd="0" presId="urn:microsoft.com/office/officeart/2005/8/layout/vList4"/>
-    <dgm:cxn modelId="{BF22BE76-DB17-4A7C-9C6A-6A21FB3D184F}" type="presOf" srcId="{AB393BA1-5855-49E3-9B86-59C4B29CEA69}" destId="{B3A218B0-FF83-4B81-B386-3F5787FB84AE}" srcOrd="0" destOrd="0" presId="urn:microsoft.com/office/officeart/2005/8/layout/vList4"/>
-    <dgm:cxn modelId="{FADBC256-B53A-4253-82DD-D9B3730AA1EC}" type="presOf" srcId="{01BDD74D-C028-4813-9A40-60C9E2F57DB0}" destId="{28517874-F162-4DF2-9EB3-F83C7A652985}" srcOrd="1" destOrd="0" presId="urn:microsoft.com/office/officeart/2005/8/layout/vList4"/>
-    <dgm:cxn modelId="{25B30777-672F-453D-A925-DF4A3A8C0EF6}" type="presOf" srcId="{EA167186-6F53-4DC7-A045-E6417D37BF33}" destId="{5B74900C-2DC2-4F9C-83EA-B674B8C455C3}" srcOrd="0" destOrd="0" presId="urn:microsoft.com/office/officeart/2005/8/layout/vList4"/>
-    <dgm:cxn modelId="{A38FB077-A8D7-40C2-A916-B9A2D88691E7}" type="presOf" srcId="{B1A5E10D-28EF-4A53-BB42-ADFCEDD33914}" destId="{1A6920FE-A97C-4482-AA47-1D4A8C2D730F}" srcOrd="1" destOrd="0" presId="urn:microsoft.com/office/officeart/2005/8/layout/vList4"/>
-    <dgm:cxn modelId="{E9CD9087-4D76-4DCC-976E-CEF58E4BDA7B}" srcId="{8DA69A69-DF68-414D-8EA4-5B891DFFA5AF}" destId="{01BDD74D-C028-4813-9A40-60C9E2F57DB0}" srcOrd="0" destOrd="0" parTransId="{B1B801B5-C3BE-4F62-9805-943F9ECCC34B}" sibTransId="{F35B3DDF-F275-4912-BB0B-8814AF11EBD0}"/>
-    <dgm:cxn modelId="{262F509B-DD73-42F9-9BA8-435A6AFF57F4}" type="presOf" srcId="{AB393BA1-5855-49E3-9B86-59C4B29CEA69}" destId="{9D8C2DA9-47A7-491C-9512-DC63D526E7DA}" srcOrd="1" destOrd="0" presId="urn:microsoft.com/office/officeart/2005/8/layout/vList4"/>
-    <dgm:cxn modelId="{8D5B359C-D9E7-4132-8320-19453F90DDBD}" type="presOf" srcId="{A7635277-B6AF-417B-AB49-E517FD333C49}" destId="{5409D7A6-CC75-4C85-8991-EB5D7E28A32C}" srcOrd="0" destOrd="0" presId="urn:microsoft.com/office/officeart/2005/8/layout/vList4"/>
-    <dgm:cxn modelId="{16E582A8-0239-4002-981C-4F30902CDCB6}" type="presOf" srcId="{87EED9D7-F903-415E-8AD5-FBB20E57F17C}" destId="{19D75B96-0BDF-4D45-9CDA-670E68961379}" srcOrd="0" destOrd="0" presId="urn:microsoft.com/office/officeart/2005/8/layout/vList4"/>
-    <dgm:cxn modelId="{047C46A9-F2CD-4146-951F-467E5F8CB8ED}" srcId="{8DA69A69-DF68-414D-8EA4-5B891DFFA5AF}" destId="{CE92E143-7827-4B23-958C-F5E2952926EC}" srcOrd="4" destOrd="0" parTransId="{C4D32C04-360F-4F8D-8B67-B5640F4A6D8F}" sibTransId="{9E9FB500-C656-4896-8D25-03917B48704C}"/>
-    <dgm:cxn modelId="{29C867A9-706B-4082-99B1-529CF2AA153D}" type="presOf" srcId="{011E79D2-CE12-4ACC-B4D0-D9E003466911}" destId="{FF945313-E4F2-443C-9640-F8236C883CA0}" srcOrd="1" destOrd="0" presId="urn:microsoft.com/office/officeart/2005/8/layout/vList4"/>
+    <dgm:cxn modelId="{3F70E3EC-8DAA-43A9-9201-E83ACE16E279}" type="presOf" srcId="{B1A5E10D-28EF-4A53-BB42-ADFCEDD33914}" destId="{72FDBD55-6070-4E85-AA3A-6F7522DCF49F}" srcOrd="0" destOrd="0" presId="urn:microsoft.com/office/officeart/2005/8/layout/vList4"/>
     <dgm:cxn modelId="{C1692AC0-BA0F-45DE-B396-12372577650D}" srcId="{8DA69A69-DF68-414D-8EA4-5B891DFFA5AF}" destId="{C693AF90-2E67-4389-9BB6-C5D2CAEEC1FF}" srcOrd="7" destOrd="0" parTransId="{00079A4F-B938-401D-9474-8F2025C874A4}" sibTransId="{D443B56A-500B-4402-B1F6-0F52B8475755}"/>
     <dgm:cxn modelId="{54181BCC-794E-4A3F-B69C-66358F54999E}" type="presOf" srcId="{87EED9D7-F903-415E-8AD5-FBB20E57F17C}" destId="{19010068-538E-4E7A-921F-CCE3278EC84F}" srcOrd="1" destOrd="0" presId="urn:microsoft.com/office/officeart/2005/8/layout/vList4"/>
-    <dgm:cxn modelId="{A7E17DD4-E0EF-4403-AB26-19B7F75407DC}" type="presOf" srcId="{F29A499B-128E-4ED9-A5CE-D3EC6833A092}" destId="{98518E50-33B5-489D-8AF9-BC11CE515B19}" srcOrd="1" destOrd="0" presId="urn:microsoft.com/office/officeart/2005/8/layout/vList4"/>
-    <dgm:cxn modelId="{201FA9D4-3A6B-489F-B035-67218D0EF8D5}" srcId="{8DA69A69-DF68-414D-8EA4-5B891DFFA5AF}" destId="{F29A499B-128E-4ED9-A5CE-D3EC6833A092}" srcOrd="9" destOrd="0" parTransId="{CDD56826-666D-4326-B961-511482B1AE98}" sibTransId="{34E1B6F7-AFA1-45F6-B66D-CE24B6F4F3E6}"/>
+    <dgm:cxn modelId="{A38FB077-A8D7-40C2-A916-B9A2D88691E7}" type="presOf" srcId="{B1A5E10D-28EF-4A53-BB42-ADFCEDD33914}" destId="{1A6920FE-A97C-4482-AA47-1D4A8C2D730F}" srcOrd="1" destOrd="0" presId="urn:microsoft.com/office/officeart/2005/8/layout/vList4"/>
+    <dgm:cxn modelId="{BF22BE76-DB17-4A7C-9C6A-6A21FB3D184F}" type="presOf" srcId="{AB393BA1-5855-49E3-9B86-59C4B29CEA69}" destId="{B3A218B0-FF83-4B81-B386-3F5787FB84AE}" srcOrd="0" destOrd="0" presId="urn:microsoft.com/office/officeart/2005/8/layout/vList4"/>
+    <dgm:cxn modelId="{128B230A-B289-4CB6-A6AF-E0A33A02F871}" type="presOf" srcId="{64841DF3-12D3-4C8A-A2EA-2845EC9F38D7}" destId="{C195AAFC-E8BF-40C9-B2F5-85621CF3B988}" srcOrd="1" destOrd="0" presId="urn:microsoft.com/office/officeart/2005/8/layout/vList4"/>
     <dgm:cxn modelId="{F3ED81DC-2C51-47EE-A31F-B6E976CD6458}" srcId="{8DA69A69-DF68-414D-8EA4-5B891DFFA5AF}" destId="{AB393BA1-5855-49E3-9B86-59C4B29CEA69}" srcOrd="2" destOrd="0" parTransId="{FB136A78-F087-494B-A4DD-4AF3EF01BF04}" sibTransId="{CFE1A1C0-1939-44E8-B395-EE878B1AED03}"/>
-    <dgm:cxn modelId="{48C0D9DC-8DEF-4A18-A0E2-0A591D1D23D4}" srcId="{8DA69A69-DF68-414D-8EA4-5B891DFFA5AF}" destId="{64841DF3-12D3-4C8A-A2EA-2845EC9F38D7}" srcOrd="8" destOrd="0" parTransId="{A9E857A5-108E-46DC-B1FD-F3877D7A6824}" sibTransId="{063C695B-C458-492E-9DD8-8C80EDD037E4}"/>
+    <dgm:cxn modelId="{705C021B-4DD7-4E5D-89C9-EDEBD5F17379}" type="presOf" srcId="{CE92E143-7827-4B23-958C-F5E2952926EC}" destId="{BE359720-3DA6-45D3-B11C-BC16643AE4C6}" srcOrd="1" destOrd="0" presId="urn:microsoft.com/office/officeart/2005/8/layout/vList4"/>
+    <dgm:cxn modelId="{824BE007-D8A8-4BC5-A897-8BE1CC7D6DDF}" type="presOf" srcId="{C693AF90-2E67-4389-9BB6-C5D2CAEEC1FF}" destId="{DD756981-072A-4F78-ABC7-E2A848633815}" srcOrd="1" destOrd="0" presId="urn:microsoft.com/office/officeart/2005/8/layout/vList4"/>
+    <dgm:cxn modelId="{16E582A8-0239-4002-981C-4F30902CDCB6}" type="presOf" srcId="{87EED9D7-F903-415E-8AD5-FBB20E57F17C}" destId="{19D75B96-0BDF-4D45-9CDA-670E68961379}" srcOrd="0" destOrd="0" presId="urn:microsoft.com/office/officeart/2005/8/layout/vList4"/>
+    <dgm:cxn modelId="{E8D64E65-62F1-48F0-A7F4-ECB5F990C6DE}" type="presOf" srcId="{EA167186-6F53-4DC7-A045-E6417D37BF33}" destId="{D2600429-E556-46F6-80E8-880C4820F655}" srcOrd="1" destOrd="0" presId="urn:microsoft.com/office/officeart/2005/8/layout/vList4"/>
+    <dgm:cxn modelId="{047C46A9-F2CD-4146-951F-467E5F8CB8ED}" srcId="{8DA69A69-DF68-414D-8EA4-5B891DFFA5AF}" destId="{CE92E143-7827-4B23-958C-F5E2952926EC}" srcOrd="4" destOrd="0" parTransId="{C4D32C04-360F-4F8D-8B67-B5640F4A6D8F}" sibTransId="{9E9FB500-C656-4896-8D25-03917B48704C}"/>
     <dgm:cxn modelId="{876943E5-6311-4C46-B02D-095CFB15C899}" srcId="{8DA69A69-DF68-414D-8EA4-5B891DFFA5AF}" destId="{A7635277-B6AF-417B-AB49-E517FD333C49}" srcOrd="6" destOrd="0" parTransId="{C477E470-852C-42A8-B063-8341FC3C990C}" sibTransId="{71F53B31-01A5-4EDB-848A-6A0AD6C5A84A}"/>
-    <dgm:cxn modelId="{8A6687E5-21B2-435D-B10C-332268480112}" srcId="{8DA69A69-DF68-414D-8EA4-5B891DFFA5AF}" destId="{EA167186-6F53-4DC7-A045-E6417D37BF33}" srcOrd="3" destOrd="0" parTransId="{AA45AC8D-893E-49DB-8316-613BBB5646B5}" sibTransId="{9FE0364B-209B-4506-9049-4401EA19AFBC}"/>
-    <dgm:cxn modelId="{462546E9-5FC3-417D-9427-DDC067EFBA53}" type="presOf" srcId="{8DA69A69-DF68-414D-8EA4-5B891DFFA5AF}" destId="{3245D8A3-8E5E-4370-9560-7D50F08D1AAC}" srcOrd="0" destOrd="0" presId="urn:microsoft.com/office/officeart/2005/8/layout/vList4"/>
-    <dgm:cxn modelId="{3F70E3EC-8DAA-43A9-9201-E83ACE16E279}" type="presOf" srcId="{B1A5E10D-28EF-4A53-BB42-ADFCEDD33914}" destId="{72FDBD55-6070-4E85-AA3A-6F7522DCF49F}" srcOrd="0" destOrd="0" presId="urn:microsoft.com/office/officeart/2005/8/layout/vList4"/>
-    <dgm:cxn modelId="{DB6381F9-22D0-4EC2-89ED-F9723FBC122B}" srcId="{8DA69A69-DF68-414D-8EA4-5B891DFFA5AF}" destId="{87EED9D7-F903-415E-8AD5-FBB20E57F17C}" srcOrd="10" destOrd="0" parTransId="{9CF7ABFF-4CAE-47CB-923D-1BC6D6E97E96}" sibTransId="{845A9F58-8459-4120-83F7-C236F902D2A4}"/>
-    <dgm:cxn modelId="{3E7B37FE-1F03-4B51-8A7C-5C8D70514817}" type="presOf" srcId="{A7635277-B6AF-417B-AB49-E517FD333C49}" destId="{AF33F1AF-16D3-496F-A982-1F3CBCF4FF8E}" srcOrd="1" destOrd="0" presId="urn:microsoft.com/office/officeart/2005/8/layout/vList4"/>
     <dgm:cxn modelId="{B3C88914-B663-4D88-A984-53C0250FD5C5}" type="presParOf" srcId="{3245D8A3-8E5E-4370-9560-7D50F08D1AAC}" destId="{591064D2-3FD8-4EBB-A7F6-6190915D84B9}" srcOrd="0" destOrd="0" presId="urn:microsoft.com/office/officeart/2005/8/layout/vList4"/>
     <dgm:cxn modelId="{574EADAF-8F63-40AA-AA0F-59CAD1AD1AA3}" type="presParOf" srcId="{591064D2-3FD8-4EBB-A7F6-6190915D84B9}" destId="{38C1AABC-2A80-4D18-AB70-CD76795B5F08}" srcOrd="0" destOrd="0" presId="urn:microsoft.com/office/officeart/2005/8/layout/vList4"/>
     <dgm:cxn modelId="{BC1BED41-3394-419A-9D43-3FA1CFB12F76}" type="presParOf" srcId="{591064D2-3FD8-4EBB-A7F6-6190915D84B9}" destId="{36A321AB-B414-459A-92C0-C559ED15EF30}" srcOrd="1" destOrd="0" presId="urn:microsoft.com/office/officeart/2005/8/layout/vList4"/>
@@ -3955,6 +3995,26 @@
               <a:latin typeface="+mj-lt"/>
             </a:rPr>
             <a:t>Create and Train Model</a:t>
+          </a:r>
+        </a:p>
+        <a:p>
+          <a:pPr marL="228600" lvl="1" indent="-228600" algn="l" defTabSz="889000">
+            <a:lnSpc>
+              <a:spcPct val="90000"/>
+            </a:lnSpc>
+            <a:spcBef>
+              <a:spcPct val="0"/>
+            </a:spcBef>
+            <a:spcAft>
+              <a:spcPct val="15000"/>
+            </a:spcAft>
+            <a:buChar char="•"/>
+          </a:pPr>
+          <a:r>
+            <a:rPr lang="en-US" sz="2000" kern="1200" dirty="0">
+              <a:latin typeface="+mj-lt"/>
+            </a:rPr>
+            <a:t>Evaluation</a:t>
           </a:r>
         </a:p>
       </dsp:txBody>
@@ -8420,7 +8480,7 @@
               <a:rPr lang="en-US" smtClean="0">
                 <a:latin typeface="Segoe UI" pitchFamily="34" charset="0"/>
               </a:rPr>
-              <a:t>3/5/2017 6:24 AM</a:t>
+              <a:t>3/27/2017 7:05 AM</a:t>
             </a:fld>
             <a:endParaRPr lang="en-US" dirty="0">
               <a:latin typeface="Segoe UI" pitchFamily="34" charset="0"/>
@@ -11554,18 +11614,12 @@
               <a:buAutoNum type="arabicPeriod"/>
             </a:pPr>
             <a:r>
-              <a:rPr lang="en-US" sz="1800" baseline="0" dirty="0"/>
-              <a:t>Understand feature selection</a:t>
+              <a:rPr lang="en-US" sz="1800" baseline="0"/>
+              <a:t>Understand </a:t>
             </a:r>
-          </a:p>
-          <a:p>
-            <a:pPr marL="445862" lvl="1" indent="-228600">
-              <a:buFont typeface="+mj-lt"/>
-              <a:buAutoNum type="arabicPeriod"/>
-            </a:pPr>
             <a:r>
               <a:rPr lang="en-US" sz="1800" baseline="0" dirty="0"/>
-              <a:t>Understand Azure Storage Options</a:t>
+              <a:t>Azure Storage Options</a:t>
             </a:r>
           </a:p>
           <a:p>
@@ -11932,10 +11986,9 @@
           <a:lstStyle/>
           <a:p>
             <a:r>
-              <a:rPr lang="en-US" sz="1800"/>
+              <a:rPr lang="en-US" sz="1800" dirty="0"/>
               <a:t>Questions?</a:t>
             </a:r>
-            <a:endParaRPr lang="en-US" sz="1800" dirty="0"/>
           </a:p>
         </p:txBody>
       </p:sp>
@@ -12272,7 +12325,25 @@
               <a:rPr lang="en-US" sz="1800" baseline="0" dirty="0"/>
               <a:t> management and monitor</a:t>
             </a:r>
-            <a:endParaRPr lang="en-US" sz="1800" dirty="0"/>
+          </a:p>
+          <a:p>
+            <a:pPr marL="228600" indent="-228600">
+              <a:buFont typeface="+mj-lt"/>
+              <a:buAutoNum type="arabicPeriod"/>
+            </a:pPr>
+            <a:r>
+              <a:rPr lang="en-US" sz="1800" dirty="0"/>
+              <a:t>A</a:t>
+            </a:r>
+            <a:r>
+              <a:rPr lang="en-US" sz="1800" baseline="0" dirty="0"/>
+              <a:t> great resource for a team involved in data science to get started: </a:t>
+            </a:r>
+            <a:r>
+              <a:rPr lang="en-US" sz="1800" u="sng" dirty="0"/>
+              <a:t>https://github.com/Azure/Microsoft-TDSP</a:t>
+            </a:r>
+            <a:endParaRPr lang="en-US" sz="1800" u="sng" dirty="0"/>
           </a:p>
           <a:p>
             <a:pPr marL="228600" indent="-228600">
@@ -13180,9 +13251,12 @@
           <a:bodyPr/>
           <a:lstStyle/>
           <a:p>
+            <a:pPr marL="342900" indent="-342900">
+              <a:buAutoNum type="arabicPeriod"/>
+            </a:pPr>
             <a:r>
               <a:rPr lang="en-US" sz="1600" dirty="0"/>
-              <a:t>1.  In reference to machine</a:t>
+              <a:t>In reference to machine</a:t>
             </a:r>
             <a:r>
               <a:rPr lang="en-US" sz="1600" baseline="0" dirty="0"/>
@@ -13198,6 +13272,28 @@
               <a:rPr lang="en-US" sz="1600" baseline="0" dirty="0"/>
               <a:t> </a:t>
             </a:r>
+          </a:p>
+          <a:p>
+            <a:pPr marL="342900" indent="-342900">
+              <a:buAutoNum type="arabicPeriod"/>
+            </a:pPr>
+            <a:r>
+              <a:rPr lang="en-US" sz="1600" baseline="0" dirty="0"/>
+              <a:t>Great whitepaper on preprocessing data in R and important questions to ask: </a:t>
+            </a:r>
+            <a:r>
+              <a:rPr lang="en-US" sz="1600" u="sng" baseline="0" dirty="0">
+                <a:solidFill>
+                  <a:schemeClr val="accent2"/>
+                </a:solidFill>
+              </a:rPr>
+              <a:t>https://info.microsoft.com/rs/157-GQE-382/images/EN-CNTNT-Whitepaper-Data-Prep-Using-R.pdf</a:t>
+            </a:r>
+          </a:p>
+          <a:p>
+            <a:pPr marL="342900" indent="-342900">
+              <a:buAutoNum type="arabicPeriod"/>
+            </a:pPr>
             <a:endParaRPr lang="en-US" sz="1600" dirty="0"/>
           </a:p>
         </p:txBody>
@@ -18179,7 +18275,7 @@
           <a:p>
             <a:fld id="{93C52C2B-7042-40BF-8872-17B0983F4A66}" type="datetimeFigureOut">
               <a:rPr lang="en-US" smtClean="0"/>
-              <a:t>3/5/2017</a:t>
+              <a:t>3/27/2017</a:t>
             </a:fld>
             <a:endParaRPr lang="en-US"/>
           </a:p>
@@ -18347,7 +18443,7 @@
           <a:p>
             <a:fld id="{93C52C2B-7042-40BF-8872-17B0983F4A66}" type="datetimeFigureOut">
               <a:rPr lang="en-US" smtClean="0"/>
-              <a:t>3/5/2017</a:t>
+              <a:t>3/27/2017</a:t>
             </a:fld>
             <a:endParaRPr lang="en-US"/>
           </a:p>
@@ -18592,7 +18688,7 @@
           <a:p>
             <a:fld id="{93C52C2B-7042-40BF-8872-17B0983F4A66}" type="datetimeFigureOut">
               <a:rPr lang="en-US" smtClean="0"/>
-              <a:t>3/5/2017</a:t>
+              <a:t>3/27/2017</a:t>
             </a:fld>
             <a:endParaRPr lang="en-US"/>
           </a:p>
@@ -18854,7 +18950,7 @@
           <a:p>
             <a:fld id="{93C52C2B-7042-40BF-8872-17B0983F4A66}" type="datetimeFigureOut">
               <a:rPr lang="en-US" smtClean="0"/>
-              <a:t>3/5/2017</a:t>
+              <a:t>3/27/2017</a:t>
             </a:fld>
             <a:endParaRPr lang="en-US"/>
           </a:p>
@@ -19218,7 +19314,7 @@
           <a:p>
             <a:fld id="{93C52C2B-7042-40BF-8872-17B0983F4A66}" type="datetimeFigureOut">
               <a:rPr lang="en-US" smtClean="0"/>
-              <a:t>3/5/2017</a:t>
+              <a:t>3/27/2017</a:t>
             </a:fld>
             <a:endParaRPr lang="en-US"/>
           </a:p>
@@ -19335,7 +19431,7 @@
           <a:p>
             <a:fld id="{93C52C2B-7042-40BF-8872-17B0983F4A66}" type="datetimeFigureOut">
               <a:rPr lang="en-US" smtClean="0"/>
-              <a:t>3/5/2017</a:t>
+              <a:t>3/27/2017</a:t>
             </a:fld>
             <a:endParaRPr lang="en-US"/>
           </a:p>
@@ -19430,7 +19526,7 @@
           <a:p>
             <a:fld id="{93C52C2B-7042-40BF-8872-17B0983F4A66}" type="datetimeFigureOut">
               <a:rPr lang="en-US" smtClean="0"/>
-              <a:t>3/5/2017</a:t>
+              <a:t>3/27/2017</a:t>
             </a:fld>
             <a:endParaRPr lang="en-US"/>
           </a:p>
@@ -19705,7 +19801,7 @@
           <a:p>
             <a:fld id="{93C52C2B-7042-40BF-8872-17B0983F4A66}" type="datetimeFigureOut">
               <a:rPr lang="en-US" smtClean="0"/>
-              <a:t>3/5/2017</a:t>
+              <a:t>3/27/2017</a:t>
             </a:fld>
             <a:endParaRPr lang="en-US"/>
           </a:p>
@@ -19957,7 +20053,7 @@
           <a:p>
             <a:fld id="{93C52C2B-7042-40BF-8872-17B0983F4A66}" type="datetimeFigureOut">
               <a:rPr lang="en-US" smtClean="0"/>
-              <a:t>3/5/2017</a:t>
+              <a:t>3/27/2017</a:t>
             </a:fld>
             <a:endParaRPr lang="en-US"/>
           </a:p>
@@ -20125,7 +20221,7 @@
           <a:p>
             <a:fld id="{93C52C2B-7042-40BF-8872-17B0983F4A66}" type="datetimeFigureOut">
               <a:rPr lang="en-US" smtClean="0"/>
-              <a:t>3/5/2017</a:t>
+              <a:t>3/27/2017</a:t>
             </a:fld>
             <a:endParaRPr lang="en-US"/>
           </a:p>
@@ -20303,7 +20399,7 @@
           <a:p>
             <a:fld id="{93C52C2B-7042-40BF-8872-17B0983F4A66}" type="datetimeFigureOut">
               <a:rPr lang="en-US" smtClean="0"/>
-              <a:t>3/5/2017</a:t>
+              <a:t>3/27/2017</a:t>
             </a:fld>
             <a:endParaRPr lang="en-US"/>
           </a:p>
@@ -22252,7 +22348,7 @@
           <a:p>
             <a:fld id="{93C52C2B-7042-40BF-8872-17B0983F4A66}" type="datetimeFigureOut">
               <a:rPr lang="en-US" smtClean="0"/>
-              <a:t>3/5/2017</a:t>
+              <a:t>3/27/2017</a:t>
             </a:fld>
             <a:endParaRPr lang="en-US"/>
           </a:p>
@@ -24437,7 +24533,7 @@
           <a:graphicData uri="http://schemas.openxmlformats.org/presentationml/2006/ole">
             <mc:AlternateContent xmlns:mc="http://schemas.openxmlformats.org/markup-compatibility/2006">
               <mc:Choice xmlns:v="urn:schemas-microsoft-com:vml" Requires="v">
-                <p:oleObj spid="_x0000_s1026" name="think-cell Slide" r:id="rId17" imgW="383" imgH="384" progId="TCLayout.ActiveDocument.1">
+                <p:oleObj spid="_x0000_s1033" name="think-cell Slide" r:id="rId17" imgW="383" imgH="384" progId="TCLayout.ActiveDocument.1">
                   <p:embed/>
                 </p:oleObj>
               </mc:Choice>
@@ -25250,7 +25346,7 @@
           <a:p>
             <a:fld id="{93C52C2B-7042-40BF-8872-17B0983F4A66}" type="datetimeFigureOut">
               <a:rPr lang="en-US" smtClean="0"/>
-              <a:t>3/5/2017</a:t>
+              <a:t>3/27/2017</a:t>
             </a:fld>
             <a:endParaRPr lang="en-US"/>
           </a:p>
@@ -26308,7 +26404,7 @@
           <a:graphicData uri="http://schemas.openxmlformats.org/presentationml/2006/ole">
             <mc:AlternateContent xmlns:mc="http://schemas.openxmlformats.org/markup-compatibility/2006">
               <mc:Choice xmlns:v="urn:schemas-microsoft-com:vml" Requires="v">
-                <p:oleObj spid="_x0000_s2050" name="think-cell Slide" r:id="rId5" imgW="377" imgH="377" progId="TCLayout.ActiveDocument.1">
+                <p:oleObj spid="_x0000_s2057" name="think-cell Slide" r:id="rId5" imgW="377" imgH="377" progId="TCLayout.ActiveDocument.1">
                   <p:embed/>
                 </p:oleObj>
               </mc:Choice>
@@ -48776,7 +48872,7 @@
         <p:spPr>
           <a:xfrm>
             <a:off x="2415823" y="1897530"/>
-            <a:ext cx="8711776" cy="3046988"/>
+            <a:ext cx="8711776" cy="3785652"/>
           </a:xfrm>
           <a:prstGeom prst="rect">
             <a:avLst/>
@@ -48815,6 +48911,21 @@
                 <a:cs typeface="Times New Roman" panose="02020603050405020304" pitchFamily="18" charset="0"/>
               </a:rPr>
               <a:t>Azure ML</a:t>
+            </a:r>
+          </a:p>
+          <a:p>
+            <a:pPr marL="685800" indent="-685800">
+              <a:buFont typeface="Arial" panose="020B0604020202020204" pitchFamily="34" charset="0"/>
+              <a:buChar char="•"/>
+            </a:pPr>
+            <a:r>
+              <a:rPr lang="en-US" sz="4800" dirty="0">
+                <a:solidFill>
+                  <a:srgbClr val="002864"/>
+                </a:solidFill>
+                <a:cs typeface="Times New Roman" panose="02020603050405020304" pitchFamily="18" charset="0"/>
+              </a:rPr>
+              <a:t>HDInsight</a:t>
             </a:r>
           </a:p>
           <a:p>
@@ -48978,7 +49089,7 @@
         <p:spPr>
           <a:xfrm>
             <a:off x="136764" y="1803064"/>
-            <a:ext cx="7514284" cy="5386090"/>
+            <a:ext cx="7514284" cy="4765407"/>
           </a:xfrm>
           <a:prstGeom prst="rect">
             <a:avLst/>
@@ -49228,26 +49339,6 @@
                 <a:latin typeface="Segoe UI Light"/>
               </a:rPr>
               <a:t>Understand how to source and document data locations</a:t>
-            </a:r>
-          </a:p>
-          <a:p>
-            <a:pPr marL="514350" indent="-514350">
-              <a:lnSpc>
-                <a:spcPct val="100000"/>
-              </a:lnSpc>
-              <a:spcBef>
-                <a:spcPts val="1000"/>
-              </a:spcBef>
-              <a:buAutoNum type="arabicPeriod"/>
-            </a:pPr>
-            <a:r>
-              <a:rPr lang="en-US" sz="3200" dirty="0">
-                <a:solidFill>
-                  <a:srgbClr val="00B050"/>
-                </a:solidFill>
-                <a:latin typeface="Segoe UI Light"/>
-              </a:rPr>
-              <a:t>Understand feature selection</a:t>
             </a:r>
           </a:p>
           <a:p>
@@ -49988,7 +50079,7 @@
         <p:spPr>
           <a:xfrm>
             <a:off x="4450580" y="1000624"/>
-            <a:ext cx="7514284" cy="4765407"/>
+            <a:ext cx="7514284" cy="4144724"/>
           </a:xfrm>
           <a:prstGeom prst="rect">
             <a:avLst/>
@@ -50259,27 +50350,6 @@
                 </a:solidFill>
                 <a:latin typeface="Segoe UI Light"/>
               </a:rPr>
-              <a:t>Understand feature selection</a:t>
-            </a:r>
-          </a:p>
-          <a:p>
-            <a:pPr marL="514350" indent="-514350">
-              <a:lnSpc>
-                <a:spcPct val="100000"/>
-              </a:lnSpc>
-              <a:spcBef>
-                <a:spcPts val="1000"/>
-              </a:spcBef>
-              <a:buFont typeface="Arial" pitchFamily="34" charset="0"/>
-              <a:buAutoNum type="arabicPeriod"/>
-            </a:pPr>
-            <a:r>
-              <a:rPr lang="en-US" sz="3200" dirty="0">
-                <a:solidFill>
-                  <a:schemeClr val="bg1"/>
-                </a:solidFill>
-                <a:latin typeface="Segoe UI Light"/>
-              </a:rPr>
               <a:t>Understand Azure Storage Options</a:t>
             </a:r>
           </a:p>
@@ -50522,7 +50592,11 @@
           <p:cNvPr id="3" name="Diagram 2"/>
           <p:cNvGraphicFramePr/>
           <p:nvPr>
-            <p:extLst/>
+            <p:extLst>
+              <p:ext uri="{D42A27DB-BD31-4B8C-83A1-F6EECF244321}">
+                <p14:modId xmlns:p14="http://schemas.microsoft.com/office/powerpoint/2010/main" val="2520446890"/>
+              </p:ext>
+            </p:extLst>
           </p:nvPr>
         </p:nvGraphicFramePr>
         <p:xfrm>
@@ -51085,7 +51159,7 @@
         <p:spPr>
           <a:xfrm>
             <a:off x="5078776" y="1380855"/>
-            <a:ext cx="6172528" cy="4897259"/>
+            <a:ext cx="6172528" cy="5587897"/>
           </a:xfrm>
           <a:prstGeom prst="rect">
             <a:avLst/>
@@ -51353,28 +51427,35 @@
             <a:pPr marL="342834" indent="-342834" defTabSz="932563"/>
             <a:r>
               <a:rPr lang="en-US" sz="4080" dirty="0"/>
-              <a:t>Spread</a:t>
+              <a:t>Amount</a:t>
             </a:r>
           </a:p>
           <a:p>
             <a:pPr marL="342834" indent="-342834" defTabSz="932563"/>
             <a:r>
               <a:rPr lang="en-US" sz="4080" dirty="0"/>
-              <a:t>Consistency</a:t>
+              <a:t>Representative</a:t>
             </a:r>
           </a:p>
           <a:p>
             <a:pPr marL="342834" indent="-342834" defTabSz="932563"/>
             <a:r>
               <a:rPr lang="en-US" sz="4080" dirty="0"/>
-              <a:t>Types and Units</a:t>
+              <a:t>Missing values</a:t>
             </a:r>
           </a:p>
           <a:p>
             <a:pPr marL="342834" indent="-342834" defTabSz="932563"/>
             <a:r>
               <a:rPr lang="en-US" sz="4080" dirty="0"/>
-              <a:t>Representation</a:t>
+              <a:t>Types</a:t>
+            </a:r>
+          </a:p>
+          <a:p>
+            <a:pPr marL="342834" indent="-342834" defTabSz="932563"/>
+            <a:r>
+              <a:rPr lang="en-US" sz="4080" dirty="0"/>
+              <a:t>Ranges</a:t>
             </a:r>
           </a:p>
         </p:txBody>
@@ -51395,7 +51476,7 @@
         </p:blipFill>
         <p:spPr>
           <a:xfrm>
-            <a:off x="-581771" y="926389"/>
+            <a:off x="-581771" y="943642"/>
             <a:ext cx="6153067" cy="6153067"/>
           </a:xfrm>
           <a:prstGeom prst="rect">
@@ -55091,10 +55172,10 @@
     <ds:schemaRef ds:uri="http://schemas.microsoft.com/office/2006/metadata/properties"/>
     <ds:schemaRef ds:uri="http://schemas.microsoft.com/sharepoint/v3"/>
     <ds:schemaRef ds:uri="http://purl.org/dc/terms/"/>
-    <ds:schemaRef ds:uri="9bc6b55d-a734-43bd-8eab-fb065c703cf5"/>
+    <ds:schemaRef ds:uri="http://schemas.openxmlformats.org/package/2006/metadata/core-properties"/>
     <ds:schemaRef ds:uri="http://schemas.microsoft.com/office/2006/documentManagement/types"/>
     <ds:schemaRef ds:uri="http://schemas.microsoft.com/office/infopath/2007/PartnerControls"/>
-    <ds:schemaRef ds:uri="http://schemas.openxmlformats.org/package/2006/metadata/core-properties"/>
+    <ds:schemaRef ds:uri="9bc6b55d-a734-43bd-8eab-fb065c703cf5"/>
     <ds:schemaRef ds:uri="http://www.w3.org/XML/1998/namespace"/>
     <ds:schemaRef ds:uri="http://purl.org/dc/dcmitype/"/>
   </ds:schemaRefs>

</xml_diff>

<commit_message>
updates from az-dev and rerendered all pdfs
</commit_message>
<xml_diff>
--- a/Instructor/CISW - Foundations Section 2.pptx
+++ b/Instructor/CISW - Foundations Section 2.pptx
@@ -8480,7 +8480,7 @@
               <a:rPr lang="en-US" smtClean="0">
                 <a:latin typeface="Segoe UI" pitchFamily="34" charset="0"/>
               </a:rPr>
-              <a:t>3/27/2017 7:05 AM</a:t>
+              <a:t>4/13/2017 3:58 PM</a:t>
             </a:fld>
             <a:endParaRPr lang="en-US" dirty="0">
               <a:latin typeface="Segoe UI" pitchFamily="34" charset="0"/>
@@ -11618,7 +11618,26 @@
               <a:t>Understand </a:t>
             </a:r>
             <a:r>
-              <a:rPr lang="en-US" sz="1800" baseline="0" dirty="0"/>
+              <a:rPr lang="en-US" sz="1800" dirty="0"/>
+              <a:t>feature</a:t>
+            </a:r>
+            <a:r>
+              <a:rPr lang="en-US" sz="1800"/>
+              <a:t> selection</a:t>
+            </a:r>
+            <a:endParaRPr lang="en-US" sz="1800" dirty="0"/>
+          </a:p>
+          <a:p>
+            <a:pPr marL="445862" lvl="1" indent="-228600">
+              <a:buFont typeface="+mj-lt"/>
+              <a:buAutoNum type="arabicPeriod"/>
+            </a:pPr>
+            <a:r>
+              <a:rPr lang="en-US" sz="1800"/>
+              <a:t>Understand </a:t>
+            </a:r>
+            <a:r>
+              <a:rPr lang="en-US" sz="1800" baseline="0"/>
               <a:t>Azure Storage Options</a:t>
             </a:r>
           </a:p>
@@ -11628,8 +11647,12 @@
               <a:buAutoNum type="arabicPeriod"/>
             </a:pPr>
             <a:r>
+              <a:rPr lang="en-US" sz="1800" baseline="0"/>
+              <a:t>Use </a:t>
+            </a:r>
+            <a:r>
               <a:rPr lang="en-US" sz="1800" baseline="0" dirty="0"/>
-              <a:t>Use various methods to ingest data into Azure Storage</a:t>
+              <a:t>various methods to ingest data into Azure Storage</a:t>
             </a:r>
           </a:p>
           <a:p>
@@ -12343,7 +12366,6 @@
               <a:rPr lang="en-US" sz="1800" u="sng" dirty="0"/>
               <a:t>https://github.com/Azure/Microsoft-TDSP</a:t>
             </a:r>
-            <a:endParaRPr lang="en-US" sz="1800" u="sng" dirty="0"/>
           </a:p>
           <a:p>
             <a:pPr marL="228600" indent="-228600">
@@ -18275,7 +18297,7 @@
           <a:p>
             <a:fld id="{93C52C2B-7042-40BF-8872-17B0983F4A66}" type="datetimeFigureOut">
               <a:rPr lang="en-US" smtClean="0"/>
-              <a:t>3/27/2017</a:t>
+              <a:t>4/13/2017</a:t>
             </a:fld>
             <a:endParaRPr lang="en-US"/>
           </a:p>
@@ -18443,7 +18465,7 @@
           <a:p>
             <a:fld id="{93C52C2B-7042-40BF-8872-17B0983F4A66}" type="datetimeFigureOut">
               <a:rPr lang="en-US" smtClean="0"/>
-              <a:t>3/27/2017</a:t>
+              <a:t>4/13/2017</a:t>
             </a:fld>
             <a:endParaRPr lang="en-US"/>
           </a:p>
@@ -18688,7 +18710,7 @@
           <a:p>
             <a:fld id="{93C52C2B-7042-40BF-8872-17B0983F4A66}" type="datetimeFigureOut">
               <a:rPr lang="en-US" smtClean="0"/>
-              <a:t>3/27/2017</a:t>
+              <a:t>4/13/2017</a:t>
             </a:fld>
             <a:endParaRPr lang="en-US"/>
           </a:p>
@@ -18950,7 +18972,7 @@
           <a:p>
             <a:fld id="{93C52C2B-7042-40BF-8872-17B0983F4A66}" type="datetimeFigureOut">
               <a:rPr lang="en-US" smtClean="0"/>
-              <a:t>3/27/2017</a:t>
+              <a:t>4/13/2017</a:t>
             </a:fld>
             <a:endParaRPr lang="en-US"/>
           </a:p>
@@ -19314,7 +19336,7 @@
           <a:p>
             <a:fld id="{93C52C2B-7042-40BF-8872-17B0983F4A66}" type="datetimeFigureOut">
               <a:rPr lang="en-US" smtClean="0"/>
-              <a:t>3/27/2017</a:t>
+              <a:t>4/13/2017</a:t>
             </a:fld>
             <a:endParaRPr lang="en-US"/>
           </a:p>
@@ -19431,7 +19453,7 @@
           <a:p>
             <a:fld id="{93C52C2B-7042-40BF-8872-17B0983F4A66}" type="datetimeFigureOut">
               <a:rPr lang="en-US" smtClean="0"/>
-              <a:t>3/27/2017</a:t>
+              <a:t>4/13/2017</a:t>
             </a:fld>
             <a:endParaRPr lang="en-US"/>
           </a:p>
@@ -19526,7 +19548,7 @@
           <a:p>
             <a:fld id="{93C52C2B-7042-40BF-8872-17B0983F4A66}" type="datetimeFigureOut">
               <a:rPr lang="en-US" smtClean="0"/>
-              <a:t>3/27/2017</a:t>
+              <a:t>4/13/2017</a:t>
             </a:fld>
             <a:endParaRPr lang="en-US"/>
           </a:p>
@@ -19801,7 +19823,7 @@
           <a:p>
             <a:fld id="{93C52C2B-7042-40BF-8872-17B0983F4A66}" type="datetimeFigureOut">
               <a:rPr lang="en-US" smtClean="0"/>
-              <a:t>3/27/2017</a:t>
+              <a:t>4/13/2017</a:t>
             </a:fld>
             <a:endParaRPr lang="en-US"/>
           </a:p>
@@ -20053,7 +20075,7 @@
           <a:p>
             <a:fld id="{93C52C2B-7042-40BF-8872-17B0983F4A66}" type="datetimeFigureOut">
               <a:rPr lang="en-US" smtClean="0"/>
-              <a:t>3/27/2017</a:t>
+              <a:t>4/13/2017</a:t>
             </a:fld>
             <a:endParaRPr lang="en-US"/>
           </a:p>
@@ -20221,7 +20243,7 @@
           <a:p>
             <a:fld id="{93C52C2B-7042-40BF-8872-17B0983F4A66}" type="datetimeFigureOut">
               <a:rPr lang="en-US" smtClean="0"/>
-              <a:t>3/27/2017</a:t>
+              <a:t>4/13/2017</a:t>
             </a:fld>
             <a:endParaRPr lang="en-US"/>
           </a:p>
@@ -20399,7 +20421,7 @@
           <a:p>
             <a:fld id="{93C52C2B-7042-40BF-8872-17B0983F4A66}" type="datetimeFigureOut">
               <a:rPr lang="en-US" smtClean="0"/>
-              <a:t>3/27/2017</a:t>
+              <a:t>4/13/2017</a:t>
             </a:fld>
             <a:endParaRPr lang="en-US"/>
           </a:p>
@@ -22348,7 +22370,7 @@
           <a:p>
             <a:fld id="{93C52C2B-7042-40BF-8872-17B0983F4A66}" type="datetimeFigureOut">
               <a:rPr lang="en-US" smtClean="0"/>
-              <a:t>3/27/2017</a:t>
+              <a:t>4/13/2017</a:t>
             </a:fld>
             <a:endParaRPr lang="en-US"/>
           </a:p>
@@ -24533,7 +24555,7 @@
           <a:graphicData uri="http://schemas.openxmlformats.org/presentationml/2006/ole">
             <mc:AlternateContent xmlns:mc="http://schemas.openxmlformats.org/markup-compatibility/2006">
               <mc:Choice xmlns:v="urn:schemas-microsoft-com:vml" Requires="v">
-                <p:oleObj spid="_x0000_s1033" name="think-cell Slide" r:id="rId17" imgW="383" imgH="384" progId="TCLayout.ActiveDocument.1">
+                <p:oleObj spid="_x0000_s1034" name="think-cell Slide" r:id="rId17" imgW="383" imgH="384" progId="TCLayout.ActiveDocument.1">
                   <p:embed/>
                 </p:oleObj>
               </mc:Choice>
@@ -25346,7 +25368,7 @@
           <a:p>
             <a:fld id="{93C52C2B-7042-40BF-8872-17B0983F4A66}" type="datetimeFigureOut">
               <a:rPr lang="en-US" smtClean="0"/>
-              <a:t>3/27/2017</a:t>
+              <a:t>4/13/2017</a:t>
             </a:fld>
             <a:endParaRPr lang="en-US"/>
           </a:p>
@@ -26404,7 +26426,7 @@
           <a:graphicData uri="http://schemas.openxmlformats.org/presentationml/2006/ole">
             <mc:AlternateContent xmlns:mc="http://schemas.openxmlformats.org/markup-compatibility/2006">
               <mc:Choice xmlns:v="urn:schemas-microsoft-com:vml" Requires="v">
-                <p:oleObj spid="_x0000_s2057" name="think-cell Slide" r:id="rId5" imgW="377" imgH="377" progId="TCLayout.ActiveDocument.1">
+                <p:oleObj spid="_x0000_s2058" name="think-cell Slide" r:id="rId5" imgW="377" imgH="377" progId="TCLayout.ActiveDocument.1">
                   <p:embed/>
                 </p:oleObj>
               </mc:Choice>
@@ -54962,19 +54984,12 @@
 </file>
 
 <file path=customXml/item1.xml><?xml version="1.0" encoding="utf-8"?>
-<p:properties xmlns:p="http://schemas.microsoft.com/office/2006/metadata/properties" xmlns:xsi="http://www.w3.org/2001/XMLSchema-instance" xmlns:pc="http://schemas.microsoft.com/office/infopath/2007/PartnerControls">
-  <documentManagement>
-    <SharedWithUsers xmlns="9bc6b55d-a734-43bd-8eab-fb065c703cf5">
-      <UserInfo>
-        <DisplayName>Buddy Phillips</DisplayName>
-        <AccountId>143</AccountId>
-        <AccountType/>
-      </UserInfo>
-    </SharedWithUsers>
-    <_ip_UnifiedCompliancePolicyUIAction xmlns="http://schemas.microsoft.com/sharepoint/v3" xsi:nil="true"/>
-    <_ip_UnifiedCompliancePolicyProperties xmlns="http://schemas.microsoft.com/sharepoint/v3" xsi:nil="true"/>
-  </documentManagement>
-</p:properties>
+<?mso-contentType ?>
+<FormTemplates xmlns="http://schemas.microsoft.com/sharepoint/v3/contenttype/forms">
+  <Display>DocumentLibraryForm</Display>
+  <Edit>DocumentLibraryForm</Edit>
+  <New>DocumentLibraryForm</New>
+</FormTemplates>
 </file>
 
 <file path=customXml/item2.xml><?xml version="1.0" encoding="utf-8"?>
@@ -55157,27 +55172,25 @@
 </file>
 
 <file path=customXml/item3.xml><?xml version="1.0" encoding="utf-8"?>
-<?mso-contentType ?>
-<FormTemplates xmlns="http://schemas.microsoft.com/sharepoint/v3/contenttype/forms">
-  <Display>DocumentLibraryForm</Display>
-  <Edit>DocumentLibraryForm</Edit>
-  <New>DocumentLibraryForm</New>
-</FormTemplates>
+<p:properties xmlns:p="http://schemas.microsoft.com/office/2006/metadata/properties" xmlns:xsi="http://www.w3.org/2001/XMLSchema-instance" xmlns:pc="http://schemas.microsoft.com/office/infopath/2007/PartnerControls">
+  <documentManagement>
+    <SharedWithUsers xmlns="9bc6b55d-a734-43bd-8eab-fb065c703cf5">
+      <UserInfo>
+        <DisplayName>Buddy Phillips</DisplayName>
+        <AccountId>143</AccountId>
+        <AccountType/>
+      </UserInfo>
+    </SharedWithUsers>
+    <_ip_UnifiedCompliancePolicyUIAction xmlns="http://schemas.microsoft.com/sharepoint/v3" xsi:nil="true"/>
+    <_ip_UnifiedCompliancePolicyProperties xmlns="http://schemas.microsoft.com/sharepoint/v3" xsi:nil="true"/>
+  </documentManagement>
+</p:properties>
 </file>
 
 <file path=customXml/itemProps1.xml><?xml version="1.0" encoding="utf-8"?>
-<ds:datastoreItem xmlns:ds="http://schemas.openxmlformats.org/officeDocument/2006/customXml" ds:itemID="{04B7DC90-CA01-41AB-9E38-D6BECBB3019F}">
+<ds:datastoreItem xmlns:ds="http://schemas.openxmlformats.org/officeDocument/2006/customXml" ds:itemID="{5070C1CB-4151-4513-B821-D3177442A19F}">
   <ds:schemaRefs>
-    <ds:schemaRef ds:uri="http://purl.org/dc/elements/1.1/"/>
-    <ds:schemaRef ds:uri="http://schemas.microsoft.com/office/2006/metadata/properties"/>
-    <ds:schemaRef ds:uri="http://schemas.microsoft.com/sharepoint/v3"/>
-    <ds:schemaRef ds:uri="http://purl.org/dc/terms/"/>
-    <ds:schemaRef ds:uri="http://schemas.openxmlformats.org/package/2006/metadata/core-properties"/>
-    <ds:schemaRef ds:uri="http://schemas.microsoft.com/office/2006/documentManagement/types"/>
-    <ds:schemaRef ds:uri="http://schemas.microsoft.com/office/infopath/2007/PartnerControls"/>
-    <ds:schemaRef ds:uri="9bc6b55d-a734-43bd-8eab-fb065c703cf5"/>
-    <ds:schemaRef ds:uri="http://www.w3.org/XML/1998/namespace"/>
-    <ds:schemaRef ds:uri="http://purl.org/dc/dcmitype/"/>
+    <ds:schemaRef ds:uri="http://schemas.microsoft.com/sharepoint/v3/contenttype/forms"/>
   </ds:schemaRefs>
 </ds:datastoreItem>
 </file>
@@ -55202,9 +55215,18 @@
 </file>
 
 <file path=customXml/itemProps3.xml><?xml version="1.0" encoding="utf-8"?>
-<ds:datastoreItem xmlns:ds="http://schemas.openxmlformats.org/officeDocument/2006/customXml" ds:itemID="{5070C1CB-4151-4513-B821-D3177442A19F}">
+<ds:datastoreItem xmlns:ds="http://schemas.openxmlformats.org/officeDocument/2006/customXml" ds:itemID="{04B7DC90-CA01-41AB-9E38-D6BECBB3019F}">
   <ds:schemaRefs>
-    <ds:schemaRef ds:uri="http://schemas.microsoft.com/sharepoint/v3/contenttype/forms"/>
+    <ds:schemaRef ds:uri="http://purl.org/dc/elements/1.1/"/>
+    <ds:schemaRef ds:uri="http://schemas.microsoft.com/office/2006/metadata/properties"/>
+    <ds:schemaRef ds:uri="http://schemas.microsoft.com/sharepoint/v3"/>
+    <ds:schemaRef ds:uri="http://purl.org/dc/terms/"/>
+    <ds:schemaRef ds:uri="http://schemas.openxmlformats.org/package/2006/metadata/core-properties"/>
+    <ds:schemaRef ds:uri="http://schemas.microsoft.com/office/2006/documentManagement/types"/>
+    <ds:schemaRef ds:uri="http://schemas.microsoft.com/office/infopath/2007/PartnerControls"/>
+    <ds:schemaRef ds:uri="9bc6b55d-a734-43bd-8eab-fb065c703cf5"/>
+    <ds:schemaRef ds:uri="http://www.w3.org/XML/1998/namespace"/>
+    <ds:schemaRef ds:uri="http://purl.org/dc/dcmitype/"/>
   </ds:schemaRefs>
 </ds:datastoreItem>
 </file>
</xml_diff>